<commit_message>
Update project06 - 파워포인트 종합 - EZEN.pptx
</commit_message>
<xml_diff>
--- a/0 발표용 파워포인트/project06 - 파워포인트 종합 - EZEN.pptx
+++ b/0 발표용 파워포인트/project06 - 파워포인트 종합 - EZEN.pptx
@@ -9,7 +9,7 @@
   </p:notesMasterIdLst>
   <p:sldIdLst>
     <p:sldId id="301" r:id="rId2"/>
-    <p:sldId id="318" r:id="rId3"/>
+    <p:sldId id="323" r:id="rId3"/>
     <p:sldId id="262" r:id="rId4"/>
     <p:sldId id="259" r:id="rId5"/>
     <p:sldId id="285" r:id="rId6"/>
@@ -41,21 +41,35 @@
   <p:notesSz cx="6858000" cy="9144000"/>
   <p:embeddedFontLst>
     <p:embeddedFont>
-      <p:font typeface="Montserrat" charset="0"/>
+      <p:font typeface="맑은 고딕" panose="020B0503020000020004" pitchFamily="50" charset="-127"/>
       <p:regular r:id="rId31"/>
       <p:bold r:id="rId32"/>
-      <p:italic r:id="rId33"/>
-      <p:boldItalic r:id="rId34"/>
     </p:embeddedFont>
     <p:embeddedFont>
-      <p:font typeface="맑은 고딕" pitchFamily="50" charset="-127"/>
-      <p:regular r:id="rId35"/>
-      <p:bold r:id="rId36"/>
+      <p:font typeface="Montserrat" panose="020B0604020202020204" charset="0"/>
+      <p:regular r:id="rId33"/>
+      <p:bold r:id="rId34"/>
+      <p:italic r:id="rId35"/>
+      <p:boldItalic r:id="rId36"/>
     </p:embeddedFont>
     <p:embeddedFont>
-      <p:font typeface="나눔바른고딕" pitchFamily="50" charset="-127"/>
+      <p:font typeface="나눔바른고딕" panose="020B0603020101020101" pitchFamily="50" charset="-127"/>
       <p:regular r:id="rId37"/>
       <p:bold r:id="rId38"/>
+    </p:embeddedFont>
+    <p:embeddedFont>
+      <p:font typeface="KoPub돋움체 Bold" panose="020B0600000101010101" charset="-127"/>
+      <p:bold r:id="rId39"/>
+    </p:embeddedFont>
+    <p:embeddedFont>
+      <p:font typeface="Microsoft JhengHei" panose="020B0604030504040204" pitchFamily="34" charset="-120"/>
+      <p:regular r:id="rId40"/>
+      <p:bold r:id="rId41"/>
+    </p:embeddedFont>
+    <p:embeddedFont>
+      <p:font typeface="Microsoft New Tai Lue" panose="020B0502040204020203" pitchFamily="34" charset="0"/>
+      <p:regular r:id="rId42"/>
+      <p:bold r:id="rId43"/>
     </p:embeddedFont>
   </p:embeddedFontLst>
   <p:defaultTextStyle>
@@ -737,11 +751,11 @@
 </file>
 
 <file path=ppt/notesSlides/notesSlide1.xml><?xml version="1.0" encoding="utf-8"?>
-<p:notes xmlns:a="http://schemas.openxmlformats.org/drawingml/2006/main" xmlns:r="http://schemas.openxmlformats.org/officeDocument/2006/relationships" xmlns:p="http://schemas.openxmlformats.org/presentationml/2006/main" showMasterSp="0" showMasterPhAnim="0">
+<p:notes xmlns:a="http://schemas.openxmlformats.org/drawingml/2006/main" xmlns:r="http://schemas.openxmlformats.org/officeDocument/2006/relationships" xmlns:p="http://schemas.openxmlformats.org/presentationml/2006/main">
   <p:cSld>
     <p:spTree>
       <p:nvGrpSpPr>
-        <p:cNvPr id="1" name="Shape 98"/>
+        <p:cNvPr id="1" name=""/>
         <p:cNvGrpSpPr/>
         <p:nvPr/>
       </p:nvGrpSpPr>
@@ -755,84 +769,77 @@
       </p:grpSpPr>
       <p:sp>
         <p:nvSpPr>
-          <p:cNvPr id="99" name="Google Shape;99;g35ed75ccf_015:notes"/>
+          <p:cNvPr id="2" name="슬라이드 이미지 개체 틀 1"/>
           <p:cNvSpPr>
             <a:spLocks noGrp="1" noRot="1" noChangeAspect="1"/>
           </p:cNvSpPr>
           <p:nvPr>
-            <p:ph type="sldImg" idx="2"/>
+            <p:ph type="sldImg"/>
           </p:nvPr>
         </p:nvSpPr>
         <p:spPr>
           <a:xfrm>
-            <a:off x="381000" y="685800"/>
-            <a:ext cx="6096000" cy="3429000"/>
+            <a:off x="685800" y="1143000"/>
+            <a:ext cx="5486400" cy="3086100"/>
           </a:xfrm>
-          <a:custGeom>
-            <a:avLst/>
-            <a:gdLst/>
-            <a:ahLst/>
-            <a:cxnLst/>
-            <a:rect l="l" t="t" r="r" b="b"/>
-            <a:pathLst>
-              <a:path w="120000" h="120000" extrusionOk="0">
-                <a:moveTo>
-                  <a:pt x="0" y="0"/>
-                </a:moveTo>
-                <a:lnTo>
-                  <a:pt x="120000" y="0"/>
-                </a:lnTo>
-                <a:lnTo>
-                  <a:pt x="120000" y="120000"/>
-                </a:lnTo>
-                <a:lnTo>
-                  <a:pt x="0" y="120000"/>
-                </a:lnTo>
-                <a:close/>
-              </a:path>
-            </a:pathLst>
-          </a:custGeom>
         </p:spPr>
       </p:sp>
       <p:sp>
         <p:nvSpPr>
-          <p:cNvPr id="100" name="Google Shape;100;g35ed75ccf_015:notes"/>
-          <p:cNvSpPr txBox="1">
+          <p:cNvPr id="3" name="슬라이드 노트 개체 틀 2"/>
+          <p:cNvSpPr>
             <a:spLocks noGrp="1"/>
           </p:cNvSpPr>
           <p:nvPr>
             <p:ph type="body" idx="1"/>
           </p:nvPr>
         </p:nvSpPr>
+        <p:spPr/>
+        <p:txBody>
+          <a:bodyPr/>
+          <a:lstStyle/>
+          <a:p>
+            <a:endParaRPr kumimoji="1" lang="ko-KR" altLang="en-US" dirty="0"/>
+          </a:p>
+        </p:txBody>
+      </p:sp>
+      <p:sp>
+        <p:nvSpPr>
+          <p:cNvPr id="4" name="슬라이드 번호 개체 틀 3"/>
+          <p:cNvSpPr>
+            <a:spLocks noGrp="1"/>
+          </p:cNvSpPr>
+          <p:nvPr>
+            <p:ph type="sldNum" sz="quarter" idx="10"/>
+          </p:nvPr>
+        </p:nvSpPr>
         <p:spPr>
           <a:xfrm>
-            <a:off x="685800" y="4343400"/>
-            <a:ext cx="5486400" cy="4114800"/>
+            <a:off x="3884613" y="8685213"/>
+            <a:ext cx="2971800" cy="457200"/>
           </a:xfrm>
           <a:prstGeom prst="rect">
             <a:avLst/>
           </a:prstGeom>
         </p:spPr>
         <p:txBody>
-          <a:bodyPr spcFirstLastPara="1" wrap="square" lIns="91425" tIns="91425" rIns="91425" bIns="91425" anchor="t" anchorCtr="0">
-            <a:noAutofit/>
-          </a:bodyPr>
+          <a:bodyPr/>
           <a:lstStyle/>
           <a:p>
-            <a:pPr marL="0" lvl="0" indent="0" algn="l" rtl="0">
-              <a:spcBef>
-                <a:spcPts val="0"/>
-              </a:spcBef>
-              <a:spcAft>
-                <a:spcPts val="0"/>
-              </a:spcAft>
-              <a:buNone/>
-            </a:pPr>
-            <a:endParaRPr/>
+            <a:fld id="{05F4A89D-53D5-334E-8539-973AE735D509}" type="slidenum">
+              <a:rPr kumimoji="1" lang="ko-KR" altLang="en-US" smtClean="0"/>
+              <a:t>2</a:t>
+            </a:fld>
+            <a:endParaRPr kumimoji="1" lang="ko-KR" altLang="en-US"/>
           </a:p>
         </p:txBody>
       </p:sp>
     </p:spTree>
+    <p:extLst>
+      <p:ext uri="{BB962C8B-B14F-4D97-AF65-F5344CB8AC3E}">
+        <p14:creationId xmlns:p14="http://schemas.microsoft.com/office/powerpoint/2010/main" val="1654373924"/>
+      </p:ext>
+    </p:extLst>
   </p:cSld>
   <p:clrMapOvr>
     <a:masterClrMapping/>
@@ -3376,7 +3383,7 @@
           <p:cNvPr id="2" name="제목 1">
             <a:extLst>
               <a:ext uri="{FF2B5EF4-FFF2-40B4-BE49-F238E27FC236}">
-                <a16:creationId xmlns="" xmlns:a16="http://schemas.microsoft.com/office/drawing/2014/main" id="{BC4B5A23-C81F-4AF5-A748-1D1EE93505F9}"/>
+                <a16:creationId xmlns:a16="http://schemas.microsoft.com/office/drawing/2014/main" xmlns="" id="{BC4B5A23-C81F-4AF5-A748-1D1EE93505F9}"/>
               </a:ext>
             </a:extLst>
           </p:cNvPr>
@@ -3413,7 +3420,7 @@
           <p:cNvPr id="3" name="부제목 2">
             <a:extLst>
               <a:ext uri="{FF2B5EF4-FFF2-40B4-BE49-F238E27FC236}">
-                <a16:creationId xmlns="" xmlns:a16="http://schemas.microsoft.com/office/drawing/2014/main" id="{26F8B85E-9692-4475-9B5C-3E3DB5D88828}"/>
+                <a16:creationId xmlns:a16="http://schemas.microsoft.com/office/drawing/2014/main" xmlns="" id="{26F8B85E-9692-4475-9B5C-3E3DB5D88828}"/>
               </a:ext>
             </a:extLst>
           </p:cNvPr>
@@ -3483,7 +3490,7 @@
           <p:cNvPr id="4" name="날짜 개체 틀 3">
             <a:extLst>
               <a:ext uri="{FF2B5EF4-FFF2-40B4-BE49-F238E27FC236}">
-                <a16:creationId xmlns="" xmlns:a16="http://schemas.microsoft.com/office/drawing/2014/main" id="{BC005B73-604A-4AB5-8137-DDC71FB7678B}"/>
+                <a16:creationId xmlns:a16="http://schemas.microsoft.com/office/drawing/2014/main" xmlns="" id="{BC005B73-604A-4AB5-8137-DDC71FB7678B}"/>
               </a:ext>
             </a:extLst>
           </p:cNvPr>
@@ -3533,7 +3540,7 @@
           <p:cNvPr id="5" name="바닥글 개체 틀 4">
             <a:extLst>
               <a:ext uri="{FF2B5EF4-FFF2-40B4-BE49-F238E27FC236}">
-                <a16:creationId xmlns="" xmlns:a16="http://schemas.microsoft.com/office/drawing/2014/main" id="{D657B5ED-EDEA-4726-A63A-ABCD88DDA24F}"/>
+                <a16:creationId xmlns:a16="http://schemas.microsoft.com/office/drawing/2014/main" xmlns="" id="{D657B5ED-EDEA-4726-A63A-ABCD88DDA24F}"/>
               </a:ext>
             </a:extLst>
           </p:cNvPr>
@@ -3572,7 +3579,7 @@
           <p:cNvPr id="6" name="슬라이드 번호 개체 틀 5">
             <a:extLst>
               <a:ext uri="{FF2B5EF4-FFF2-40B4-BE49-F238E27FC236}">
-                <a16:creationId xmlns="" xmlns:a16="http://schemas.microsoft.com/office/drawing/2014/main" id="{EE561B83-F1A6-46DA-BD34-3B375CB3487C}"/>
+                <a16:creationId xmlns:a16="http://schemas.microsoft.com/office/drawing/2014/main" xmlns="" id="{EE561B83-F1A6-46DA-BD34-3B375CB3487C}"/>
               </a:ext>
             </a:extLst>
           </p:cNvPr>
@@ -5205,7 +5212,7 @@
           <p:cNvPr id="28" name="그룹 27">
             <a:extLst>
               <a:ext uri="{FF2B5EF4-FFF2-40B4-BE49-F238E27FC236}">
-                <a16:creationId xmlns="" xmlns:a16="http://schemas.microsoft.com/office/drawing/2014/main" id="{93ED6B66-45E2-4F28-BD4E-9A683E3FCF6D}"/>
+                <a16:creationId xmlns:a16="http://schemas.microsoft.com/office/drawing/2014/main" xmlns="" id="{93ED6B66-45E2-4F28-BD4E-9A683E3FCF6D}"/>
               </a:ext>
             </a:extLst>
           </p:cNvPr>
@@ -5232,7 +5239,7 @@
             <p:cNvPr id="29" name="Freeform 37">
               <a:extLst>
                 <a:ext uri="{FF2B5EF4-FFF2-40B4-BE49-F238E27FC236}">
-                  <a16:creationId xmlns="" xmlns:a16="http://schemas.microsoft.com/office/drawing/2014/main" id="{ADEA0806-DE38-475A-BD55-F8D173EB52A5}"/>
+                  <a16:creationId xmlns:a16="http://schemas.microsoft.com/office/drawing/2014/main" xmlns="" id="{ADEA0806-DE38-475A-BD55-F8D173EB52A5}"/>
                 </a:ext>
               </a:extLst>
             </p:cNvPr>
@@ -5817,7 +5824,7 @@
             <p:cNvPr id="30" name="Freeform 38">
               <a:extLst>
                 <a:ext uri="{FF2B5EF4-FFF2-40B4-BE49-F238E27FC236}">
-                  <a16:creationId xmlns="" xmlns:a16="http://schemas.microsoft.com/office/drawing/2014/main" id="{D13F76C6-5E5B-4424-A081-09B1E62D8939}"/>
+                  <a16:creationId xmlns:a16="http://schemas.microsoft.com/office/drawing/2014/main" xmlns="" id="{D13F76C6-5E5B-4424-A081-09B1E62D8939}"/>
                 </a:ext>
               </a:extLst>
             </p:cNvPr>
@@ -6371,7 +6378,7 @@
             <p:cNvPr id="31" name="Freeform 39">
               <a:extLst>
                 <a:ext uri="{FF2B5EF4-FFF2-40B4-BE49-F238E27FC236}">
-                  <a16:creationId xmlns="" xmlns:a16="http://schemas.microsoft.com/office/drawing/2014/main" id="{8AA3F8FD-3833-44C4-84F6-6C15FA66A33B}"/>
+                  <a16:creationId xmlns:a16="http://schemas.microsoft.com/office/drawing/2014/main" xmlns="" id="{8AA3F8FD-3833-44C4-84F6-6C15FA66A33B}"/>
                 </a:ext>
               </a:extLst>
             </p:cNvPr>
@@ -6859,7 +6866,7 @@
             <p:cNvPr id="32" name="Freeform 40">
               <a:extLst>
                 <a:ext uri="{FF2B5EF4-FFF2-40B4-BE49-F238E27FC236}">
-                  <a16:creationId xmlns="" xmlns:a16="http://schemas.microsoft.com/office/drawing/2014/main" id="{82A8B903-85D9-4AC8-B553-A53FF1528DD6}"/>
+                  <a16:creationId xmlns:a16="http://schemas.microsoft.com/office/drawing/2014/main" xmlns="" id="{82A8B903-85D9-4AC8-B553-A53FF1528DD6}"/>
                 </a:ext>
               </a:extLst>
             </p:cNvPr>
@@ -7171,7 +7178,7 @@
             <p:cNvPr id="33" name="Freeform 41">
               <a:extLst>
                 <a:ext uri="{FF2B5EF4-FFF2-40B4-BE49-F238E27FC236}">
-                  <a16:creationId xmlns="" xmlns:a16="http://schemas.microsoft.com/office/drawing/2014/main" id="{23150D66-8A0D-4D47-BDFD-CEC8C82F95CB}"/>
+                  <a16:creationId xmlns:a16="http://schemas.microsoft.com/office/drawing/2014/main" xmlns="" id="{23150D66-8A0D-4D47-BDFD-CEC8C82F95CB}"/>
                 </a:ext>
               </a:extLst>
             </p:cNvPr>
@@ -7780,7 +7787,7 @@
             <p:cNvPr id="34" name="Freeform 51">
               <a:extLst>
                 <a:ext uri="{FF2B5EF4-FFF2-40B4-BE49-F238E27FC236}">
-                  <a16:creationId xmlns="" xmlns:a16="http://schemas.microsoft.com/office/drawing/2014/main" id="{D1395DDB-4798-4901-96C1-6E8A0C25E5BB}"/>
+                  <a16:creationId xmlns:a16="http://schemas.microsoft.com/office/drawing/2014/main" xmlns="" id="{D1395DDB-4798-4901-96C1-6E8A0C25E5BB}"/>
                 </a:ext>
               </a:extLst>
             </p:cNvPr>
@@ -8276,7 +8283,7 @@
             <p:cNvPr id="35" name="Freeform 52">
               <a:extLst>
                 <a:ext uri="{FF2B5EF4-FFF2-40B4-BE49-F238E27FC236}">
-                  <a16:creationId xmlns="" xmlns:a16="http://schemas.microsoft.com/office/drawing/2014/main" id="{3FFE6A3B-C3E4-4B4C-A5AF-30A6ED7A63F0}"/>
+                  <a16:creationId xmlns:a16="http://schemas.microsoft.com/office/drawing/2014/main" xmlns="" id="{3FFE6A3B-C3E4-4B4C-A5AF-30A6ED7A63F0}"/>
                 </a:ext>
               </a:extLst>
             </p:cNvPr>
@@ -8384,7 +8391,7 @@
             <p:cNvPr id="36" name="Freeform 53">
               <a:extLst>
                 <a:ext uri="{FF2B5EF4-FFF2-40B4-BE49-F238E27FC236}">
-                  <a16:creationId xmlns="" xmlns:a16="http://schemas.microsoft.com/office/drawing/2014/main" id="{02E90574-0A63-4622-B924-3593D481085C}"/>
+                  <a16:creationId xmlns:a16="http://schemas.microsoft.com/office/drawing/2014/main" xmlns="" id="{02E90574-0A63-4622-B924-3593D481085C}"/>
                 </a:ext>
               </a:extLst>
             </p:cNvPr>
@@ -8441,7 +8448,7 @@
             <p:cNvPr id="37" name="Freeform 54">
               <a:extLst>
                 <a:ext uri="{FF2B5EF4-FFF2-40B4-BE49-F238E27FC236}">
-                  <a16:creationId xmlns="" xmlns:a16="http://schemas.microsoft.com/office/drawing/2014/main" id="{EF4B07AC-CF9B-451A-A3AF-0F38C9A9E8FD}"/>
+                  <a16:creationId xmlns:a16="http://schemas.microsoft.com/office/drawing/2014/main" xmlns="" id="{EF4B07AC-CF9B-451A-A3AF-0F38C9A9E8FD}"/>
                 </a:ext>
               </a:extLst>
             </p:cNvPr>
@@ -8809,7 +8816,7 @@
           <p:cNvPr id="11" name="Freeform 6">
             <a:extLst>
               <a:ext uri="{FF2B5EF4-FFF2-40B4-BE49-F238E27FC236}">
-                <a16:creationId xmlns="" xmlns:a16="http://schemas.microsoft.com/office/drawing/2014/main" id="{35433E1F-1BF4-44C0-B509-EB1742FF1405}"/>
+                <a16:creationId xmlns:a16="http://schemas.microsoft.com/office/drawing/2014/main" xmlns="" id="{35433E1F-1BF4-44C0-B509-EB1742FF1405}"/>
               </a:ext>
             </a:extLst>
           </p:cNvPr>
@@ -9208,7 +9215,7 @@
           <p:cNvPr id="13" name="Freeform 8">
             <a:extLst>
               <a:ext uri="{FF2B5EF4-FFF2-40B4-BE49-F238E27FC236}">
-                <a16:creationId xmlns="" xmlns:a16="http://schemas.microsoft.com/office/drawing/2014/main" id="{19190BD7-A4C5-49EB-A60F-06D7B1F74A20}"/>
+                <a16:creationId xmlns:a16="http://schemas.microsoft.com/office/drawing/2014/main" xmlns="" id="{19190BD7-A4C5-49EB-A60F-06D7B1F74A20}"/>
               </a:ext>
             </a:extLst>
           </p:cNvPr>
@@ -9876,7 +9883,7 @@
           <p:cNvPr id="18" name="사각형: 둥근 위쪽 모서리 17">
             <a:extLst>
               <a:ext uri="{FF2B5EF4-FFF2-40B4-BE49-F238E27FC236}">
-                <a16:creationId xmlns="" xmlns:a16="http://schemas.microsoft.com/office/drawing/2014/main" id="{BDEA6046-5656-4E1F-B418-5AD4F1F65CD1}"/>
+                <a16:creationId xmlns:a16="http://schemas.microsoft.com/office/drawing/2014/main" xmlns="" id="{BDEA6046-5656-4E1F-B418-5AD4F1F65CD1}"/>
               </a:ext>
             </a:extLst>
           </p:cNvPr>
@@ -9937,7 +9944,7 @@
           <p:cNvPr id="12" name="사각형: 둥근 위쪽 모서리 11">
             <a:extLst>
               <a:ext uri="{FF2B5EF4-FFF2-40B4-BE49-F238E27FC236}">
-                <a16:creationId xmlns="" xmlns:a16="http://schemas.microsoft.com/office/drawing/2014/main" id="{75627340-CA4C-4FDF-AC15-1D3AE4A4C536}"/>
+                <a16:creationId xmlns:a16="http://schemas.microsoft.com/office/drawing/2014/main" xmlns="" id="{75627340-CA4C-4FDF-AC15-1D3AE4A4C536}"/>
               </a:ext>
             </a:extLst>
           </p:cNvPr>
@@ -9998,7 +10005,7 @@
           <p:cNvPr id="14" name="사각형: 둥근 위쪽 모서리 13">
             <a:extLst>
               <a:ext uri="{FF2B5EF4-FFF2-40B4-BE49-F238E27FC236}">
-                <a16:creationId xmlns="" xmlns:a16="http://schemas.microsoft.com/office/drawing/2014/main" id="{FBB8B854-0C91-4123-8602-729BD5DB54ED}"/>
+                <a16:creationId xmlns:a16="http://schemas.microsoft.com/office/drawing/2014/main" xmlns="" id="{FBB8B854-0C91-4123-8602-729BD5DB54ED}"/>
               </a:ext>
             </a:extLst>
           </p:cNvPr>
@@ -10059,7 +10066,7 @@
           <p:cNvPr id="15" name="사각형: 둥근 위쪽 모서리 14">
             <a:extLst>
               <a:ext uri="{FF2B5EF4-FFF2-40B4-BE49-F238E27FC236}">
-                <a16:creationId xmlns="" xmlns:a16="http://schemas.microsoft.com/office/drawing/2014/main" id="{167316CA-8CC3-403B-8C11-60B19A432E91}"/>
+                <a16:creationId xmlns:a16="http://schemas.microsoft.com/office/drawing/2014/main" xmlns="" id="{167316CA-8CC3-403B-8C11-60B19A432E91}"/>
               </a:ext>
             </a:extLst>
           </p:cNvPr>
@@ -10120,7 +10127,7 @@
           <p:cNvPr id="6" name="자유형: 도형 5">
             <a:extLst>
               <a:ext uri="{FF2B5EF4-FFF2-40B4-BE49-F238E27FC236}">
-                <a16:creationId xmlns="" xmlns:a16="http://schemas.microsoft.com/office/drawing/2014/main" id="{01D0019B-4C1B-4151-B5F9-B30DF72D2F9C}"/>
+                <a16:creationId xmlns:a16="http://schemas.microsoft.com/office/drawing/2014/main" xmlns="" id="{01D0019B-4C1B-4151-B5F9-B30DF72D2F9C}"/>
               </a:ext>
             </a:extLst>
           </p:cNvPr>
@@ -10274,7 +10281,7 @@
           <p:cNvPr id="27" name="직사각형 26">
             <a:extLst>
               <a:ext uri="{FF2B5EF4-FFF2-40B4-BE49-F238E27FC236}">
-                <a16:creationId xmlns="" xmlns:a16="http://schemas.microsoft.com/office/drawing/2014/main" id="{C7A07ABD-FE64-47B7-8F0D-7531598644C5}"/>
+                <a16:creationId xmlns:a16="http://schemas.microsoft.com/office/drawing/2014/main" xmlns="" id="{C7A07ABD-FE64-47B7-8F0D-7531598644C5}"/>
               </a:ext>
             </a:extLst>
           </p:cNvPr>
@@ -10353,7 +10360,7 @@
           <p:cNvPr id="9" name="직선 연결선 8">
             <a:extLst>
               <a:ext uri="{FF2B5EF4-FFF2-40B4-BE49-F238E27FC236}">
-                <a16:creationId xmlns="" xmlns:a16="http://schemas.microsoft.com/office/drawing/2014/main" id="{ADD6F06E-82C7-4691-81A5-6FCAAE8DF971}"/>
+                <a16:creationId xmlns:a16="http://schemas.microsoft.com/office/drawing/2014/main" xmlns="" id="{ADD6F06E-82C7-4691-81A5-6FCAAE8DF971}"/>
               </a:ext>
             </a:extLst>
           </p:cNvPr>
@@ -10397,7 +10404,7 @@
           <p:cNvPr id="38" name="그룹 37">
             <a:extLst>
               <a:ext uri="{FF2B5EF4-FFF2-40B4-BE49-F238E27FC236}">
-                <a16:creationId xmlns="" xmlns:a16="http://schemas.microsoft.com/office/drawing/2014/main" id="{2C2E7834-32AF-460A-AC90-7CBE17CCC694}"/>
+                <a16:creationId xmlns:a16="http://schemas.microsoft.com/office/drawing/2014/main" xmlns="" id="{2C2E7834-32AF-460A-AC90-7CBE17CCC694}"/>
               </a:ext>
             </a:extLst>
           </p:cNvPr>
@@ -10417,7 +10424,7 @@
             <p:cNvPr id="39" name="자유형 65">
               <a:extLst>
                 <a:ext uri="{FF2B5EF4-FFF2-40B4-BE49-F238E27FC236}">
-                  <a16:creationId xmlns="" xmlns:a16="http://schemas.microsoft.com/office/drawing/2014/main" id="{3C6B5641-9309-4B54-BE3F-E1640860354C}"/>
+                  <a16:creationId xmlns:a16="http://schemas.microsoft.com/office/drawing/2014/main" xmlns="" id="{3C6B5641-9309-4B54-BE3F-E1640860354C}"/>
                 </a:ext>
               </a:extLst>
             </p:cNvPr>
@@ -10658,7 +10665,7 @@
             <p:cNvPr id="40" name="자유형 66">
               <a:extLst>
                 <a:ext uri="{FF2B5EF4-FFF2-40B4-BE49-F238E27FC236}">
-                  <a16:creationId xmlns="" xmlns:a16="http://schemas.microsoft.com/office/drawing/2014/main" id="{C39EC402-9800-4866-9F84-6E9C068471CD}"/>
+                  <a16:creationId xmlns:a16="http://schemas.microsoft.com/office/drawing/2014/main" xmlns="" id="{C39EC402-9800-4866-9F84-6E9C068471CD}"/>
                 </a:ext>
               </a:extLst>
             </p:cNvPr>
@@ -10836,7 +10843,7 @@
           <p:cNvPr id="44" name="Freeform 8">
             <a:extLst>
               <a:ext uri="{FF2B5EF4-FFF2-40B4-BE49-F238E27FC236}">
-                <a16:creationId xmlns="" xmlns:a16="http://schemas.microsoft.com/office/drawing/2014/main" id="{D86CAE7F-6907-4E6F-B42C-12470D4C17BF}"/>
+                <a16:creationId xmlns:a16="http://schemas.microsoft.com/office/drawing/2014/main" xmlns="" id="{D86CAE7F-6907-4E6F-B42C-12470D4C17BF}"/>
               </a:ext>
             </a:extLst>
           </p:cNvPr>
@@ -20641,9 +20648,17 @@
 <file path=ppt/slides/slide2.xml><?xml version="1.0" encoding="utf-8"?>
 <p:sld xmlns:a="http://schemas.openxmlformats.org/drawingml/2006/main" xmlns:r="http://schemas.openxmlformats.org/officeDocument/2006/relationships" xmlns:p="http://schemas.openxmlformats.org/presentationml/2006/main">
   <p:cSld>
+    <p:bg>
+      <p:bgPr>
+        <a:solidFill>
+          <a:srgbClr val="434343"/>
+        </a:solidFill>
+        <a:effectLst/>
+      </p:bgPr>
+    </p:bg>
     <p:spTree>
       <p:nvGrpSpPr>
-        <p:cNvPr id="1" name="Shape 101"/>
+        <p:cNvPr id="1" name=""/>
         <p:cNvGrpSpPr/>
         <p:nvPr/>
       </p:nvGrpSpPr>
@@ -20655,747 +20670,876 @@
           <a:chExt cx="0" cy="0"/>
         </a:xfrm>
       </p:grpSpPr>
-      <p:sp>
-        <p:nvSpPr>
-          <p:cNvPr id="102" name="Google Shape;102;p18"/>
-          <p:cNvSpPr txBox="1">
-            <a:spLocks noGrp="1"/>
-          </p:cNvSpPr>
-          <p:nvPr>
-            <p:ph type="ctrTitle" idx="4294967295"/>
-          </p:nvPr>
-        </p:nvSpPr>
-        <p:spPr>
+      <p:pic>
+        <p:nvPicPr>
+          <p:cNvPr id="1026" name="Picture 2"/>
+          <p:cNvPicPr>
+            <a:picLocks noChangeAspect="1" noChangeArrowheads="1"/>
+          </p:cNvPicPr>
+          <p:nvPr/>
+        </p:nvPicPr>
+        <p:blipFill>
+          <a:blip r:embed="rId3">
+            <a:extLst>
+              <a:ext uri="{28A0092B-C50C-407E-A947-70E740481C1C}">
+                <a14:useLocalDpi xmlns:a14="http://schemas.microsoft.com/office/drawing/2010/main" val="0"/>
+              </a:ext>
+            </a:extLst>
+          </a:blip>
+          <a:srcRect/>
+          <a:stretch>
+            <a:fillRect/>
+          </a:stretch>
+        </p:blipFill>
+        <p:spPr bwMode="auto">
           <a:xfrm>
-            <a:off x="1403648" y="781742"/>
-            <a:ext cx="1863603" cy="677386"/>
+            <a:off x="191331" y="170139"/>
+            <a:ext cx="8732519" cy="4878044"/>
           </a:xfrm>
           <a:prstGeom prst="rect">
             <a:avLst/>
           </a:prstGeom>
+          <a:noFill/>
+          <a:ln>
+            <a:noFill/>
+          </a:ln>
+          <a:effectLst/>
+          <a:extLst>
+            <a:ext uri="{909E8E84-426E-40DD-AFC4-6F175D3DCCD1}">
+              <a14:hiddenFill xmlns:a14="http://schemas.microsoft.com/office/drawing/2010/main">
+                <a:solidFill>
+                  <a:schemeClr val="accent1"/>
+                </a:solidFill>
+              </a14:hiddenFill>
+            </a:ext>
+            <a:ext uri="{91240B29-F687-4F45-9708-019B960494DF}">
+              <a14:hiddenLine xmlns:a14="http://schemas.microsoft.com/office/drawing/2010/main" w="9525">
+                <a:solidFill>
+                  <a:schemeClr val="tx1"/>
+                </a:solidFill>
+                <a:miter lim="800000"/>
+                <a:headEnd/>
+                <a:tailEnd/>
+              </a14:hiddenLine>
+            </a:ext>
+            <a:ext uri="{AF507438-7753-43E0-B8FC-AC1667EBCBE1}">
+              <a14:hiddenEffects xmlns:a14="http://schemas.microsoft.com/office/drawing/2010/main">
+                <a:effectLst>
+                  <a:outerShdw dist="35921" dir="2700000" algn="ctr" rotWithShape="0">
+                    <a:schemeClr val="bg2"/>
+                  </a:outerShdw>
+                </a:effectLst>
+              </a14:hiddenEffects>
+            </a:ext>
+          </a:extLst>
         </p:spPr>
-        <p:txBody>
-          <a:bodyPr spcFirstLastPara="1" wrap="square" lIns="91425" tIns="91425" rIns="91425" bIns="91425" anchor="t" anchorCtr="0">
-            <a:noAutofit/>
-          </a:bodyPr>
-          <a:lstStyle/>
-          <a:p>
-            <a:pPr marL="0" lvl="0" indent="0" algn="ctr" rtl="0">
-              <a:spcBef>
-                <a:spcPts val="0"/>
-              </a:spcBef>
-              <a:spcAft>
-                <a:spcPts val="0"/>
-              </a:spcAft>
-              <a:buNone/>
-            </a:pPr>
-            <a:r>
-              <a:rPr lang="ko-KR" altLang="en-US" sz="4000" dirty="0" smtClean="0">
-                <a:solidFill>
-                  <a:srgbClr val="FF9E00"/>
-                </a:solidFill>
-                <a:latin typeface="나눔바른고딕" panose="020B0603020101020101" pitchFamily="50" charset="-127"/>
-                <a:ea typeface="나눔바른고딕" panose="020B0603020101020101" pitchFamily="50" charset="-127"/>
-              </a:rPr>
-              <a:t>순</a:t>
-            </a:r>
-            <a:r>
-              <a:rPr lang="ko-KR" altLang="en-US" sz="4000" dirty="0">
-                <a:solidFill>
-                  <a:srgbClr val="FF9E00"/>
-                </a:solidFill>
-                <a:latin typeface="나눔바른고딕" panose="020B0603020101020101" pitchFamily="50" charset="-127"/>
-                <a:ea typeface="나눔바른고딕" panose="020B0603020101020101" pitchFamily="50" charset="-127"/>
-              </a:rPr>
-              <a:t>서</a:t>
-            </a:r>
-            <a:endParaRPr sz="4000" dirty="0">
-              <a:solidFill>
-                <a:srgbClr val="FF9E00"/>
-              </a:solidFill>
-              <a:latin typeface="나눔바른고딕" panose="020B0603020101020101" pitchFamily="50" charset="-127"/>
-              <a:ea typeface="나눔바른고딕" panose="020B0603020101020101" pitchFamily="50" charset="-127"/>
-            </a:endParaRPr>
-          </a:p>
-        </p:txBody>
-      </p:sp>
-      <p:grpSp>
-        <p:nvGrpSpPr>
-          <p:cNvPr id="104" name="Google Shape;104;p18"/>
-          <p:cNvGrpSpPr/>
-          <p:nvPr/>
-        </p:nvGrpSpPr>
-        <p:grpSpPr>
-          <a:xfrm>
-            <a:off x="4233487" y="499000"/>
-            <a:ext cx="677029" cy="1103729"/>
-            <a:chOff x="6730350" y="2315900"/>
-            <a:chExt cx="257700" cy="420100"/>
-          </a:xfrm>
-        </p:grpSpPr>
-        <p:sp>
-          <p:nvSpPr>
-            <p:cNvPr id="105" name="Google Shape;105;p18"/>
-            <p:cNvSpPr/>
-            <p:nvPr/>
-          </p:nvSpPr>
-          <p:spPr>
-            <a:xfrm>
-              <a:off x="6807900" y="2671250"/>
-              <a:ext cx="102600" cy="22625"/>
-            </a:xfrm>
-            <a:custGeom>
-              <a:avLst/>
-              <a:gdLst/>
-              <a:ahLst/>
-              <a:cxnLst/>
-              <a:rect l="l" t="t" r="r" b="b"/>
-              <a:pathLst>
-                <a:path w="4104" h="905" extrusionOk="0">
-                  <a:moveTo>
-                    <a:pt x="1" y="1"/>
-                  </a:moveTo>
-                  <a:lnTo>
-                    <a:pt x="1" y="905"/>
-                  </a:lnTo>
-                  <a:lnTo>
-                    <a:pt x="4104" y="905"/>
-                  </a:lnTo>
-                  <a:lnTo>
-                    <a:pt x="4104" y="1"/>
-                  </a:lnTo>
-                  <a:close/>
-                </a:path>
-              </a:pathLst>
-            </a:custGeom>
-            <a:solidFill>
-              <a:srgbClr val="FF9E00"/>
-            </a:solidFill>
-            <a:ln>
-              <a:noFill/>
-            </a:ln>
-          </p:spPr>
-          <p:txBody>
-            <a:bodyPr spcFirstLastPara="1" wrap="square" lIns="91425" tIns="91425" rIns="91425" bIns="91425" anchor="ctr" anchorCtr="0">
-              <a:noAutofit/>
-            </a:bodyPr>
-            <a:lstStyle/>
-            <a:p>
-              <a:pPr marL="0" lvl="0" indent="0" algn="l" rtl="0">
-                <a:spcBef>
-                  <a:spcPts val="0"/>
-                </a:spcBef>
-                <a:spcAft>
-                  <a:spcPts val="0"/>
-                </a:spcAft>
-                <a:buNone/>
-              </a:pPr>
-              <a:endParaRPr>
-                <a:solidFill>
-                  <a:srgbClr val="FFFFFF"/>
-                </a:solidFill>
-              </a:endParaRPr>
-            </a:p>
-          </p:txBody>
-        </p:sp>
-        <p:sp>
-          <p:nvSpPr>
-            <p:cNvPr id="106" name="Google Shape;106;p18"/>
-            <p:cNvSpPr/>
-            <p:nvPr/>
-          </p:nvSpPr>
-          <p:spPr>
-            <a:xfrm>
-              <a:off x="6807900" y="2636450"/>
-              <a:ext cx="102600" cy="22625"/>
-            </a:xfrm>
-            <a:custGeom>
-              <a:avLst/>
-              <a:gdLst/>
-              <a:ahLst/>
-              <a:cxnLst/>
-              <a:rect l="l" t="t" r="r" b="b"/>
-              <a:pathLst>
-                <a:path w="4104" h="905" extrusionOk="0">
-                  <a:moveTo>
-                    <a:pt x="1" y="1"/>
-                  </a:moveTo>
-                  <a:lnTo>
-                    <a:pt x="1" y="905"/>
-                  </a:lnTo>
-                  <a:lnTo>
-                    <a:pt x="4104" y="905"/>
-                  </a:lnTo>
-                  <a:lnTo>
-                    <a:pt x="4104" y="1"/>
-                  </a:lnTo>
-                  <a:close/>
-                </a:path>
-              </a:pathLst>
-            </a:custGeom>
-            <a:solidFill>
-              <a:srgbClr val="FF9E00"/>
-            </a:solidFill>
-            <a:ln>
-              <a:noFill/>
-            </a:ln>
-          </p:spPr>
-          <p:txBody>
-            <a:bodyPr spcFirstLastPara="1" wrap="square" lIns="91425" tIns="91425" rIns="91425" bIns="91425" anchor="ctr" anchorCtr="0">
-              <a:noAutofit/>
-            </a:bodyPr>
-            <a:lstStyle/>
-            <a:p>
-              <a:pPr marL="0" lvl="0" indent="0" algn="l" rtl="0">
-                <a:spcBef>
-                  <a:spcPts val="0"/>
-                </a:spcBef>
-                <a:spcAft>
-                  <a:spcPts val="0"/>
-                </a:spcAft>
-                <a:buNone/>
-              </a:pPr>
-              <a:endParaRPr>
-                <a:solidFill>
-                  <a:srgbClr val="FFFFFF"/>
-                </a:solidFill>
-              </a:endParaRPr>
-            </a:p>
-          </p:txBody>
-        </p:sp>
-        <p:sp>
-          <p:nvSpPr>
-            <p:cNvPr id="107" name="Google Shape;107;p18"/>
-            <p:cNvSpPr/>
-            <p:nvPr/>
-          </p:nvSpPr>
-          <p:spPr>
-            <a:xfrm>
-              <a:off x="6807900" y="2706075"/>
-              <a:ext cx="102600" cy="29925"/>
-            </a:xfrm>
-            <a:custGeom>
-              <a:avLst/>
-              <a:gdLst/>
-              <a:ahLst/>
-              <a:cxnLst/>
-              <a:rect l="l" t="t" r="r" b="b"/>
-              <a:pathLst>
-                <a:path w="4104" h="1197" extrusionOk="0">
-                  <a:moveTo>
-                    <a:pt x="1" y="0"/>
-                  </a:moveTo>
-                  <a:lnTo>
-                    <a:pt x="1" y="171"/>
-                  </a:lnTo>
-                  <a:lnTo>
-                    <a:pt x="25" y="318"/>
-                  </a:lnTo>
-                  <a:lnTo>
-                    <a:pt x="98" y="464"/>
-                  </a:lnTo>
-                  <a:lnTo>
-                    <a:pt x="196" y="586"/>
-                  </a:lnTo>
-                  <a:lnTo>
-                    <a:pt x="343" y="660"/>
-                  </a:lnTo>
-                  <a:lnTo>
-                    <a:pt x="1881" y="1172"/>
-                  </a:lnTo>
-                  <a:lnTo>
-                    <a:pt x="2052" y="1197"/>
-                  </a:lnTo>
-                  <a:lnTo>
-                    <a:pt x="2223" y="1172"/>
-                  </a:lnTo>
-                  <a:lnTo>
-                    <a:pt x="3762" y="660"/>
-                  </a:lnTo>
-                  <a:lnTo>
-                    <a:pt x="3908" y="586"/>
-                  </a:lnTo>
-                  <a:lnTo>
-                    <a:pt x="4006" y="464"/>
-                  </a:lnTo>
-                  <a:lnTo>
-                    <a:pt x="4079" y="318"/>
-                  </a:lnTo>
-                  <a:lnTo>
-                    <a:pt x="4104" y="171"/>
-                  </a:lnTo>
-                  <a:lnTo>
-                    <a:pt x="4104" y="0"/>
-                  </a:lnTo>
-                  <a:close/>
-                </a:path>
-              </a:pathLst>
-            </a:custGeom>
-            <a:solidFill>
-              <a:srgbClr val="FF9E00"/>
-            </a:solidFill>
-            <a:ln>
-              <a:noFill/>
-            </a:ln>
-          </p:spPr>
-          <p:txBody>
-            <a:bodyPr spcFirstLastPara="1" wrap="square" lIns="91425" tIns="91425" rIns="91425" bIns="91425" anchor="ctr" anchorCtr="0">
-              <a:noAutofit/>
-            </a:bodyPr>
-            <a:lstStyle/>
-            <a:p>
-              <a:pPr marL="0" lvl="0" indent="0" algn="l" rtl="0">
-                <a:spcBef>
-                  <a:spcPts val="0"/>
-                </a:spcBef>
-                <a:spcAft>
-                  <a:spcPts val="0"/>
-                </a:spcAft>
-                <a:buNone/>
-              </a:pPr>
-              <a:endParaRPr>
-                <a:solidFill>
-                  <a:srgbClr val="FFFFFF"/>
-                </a:solidFill>
-              </a:endParaRPr>
-            </a:p>
-          </p:txBody>
-        </p:sp>
-        <p:sp>
-          <p:nvSpPr>
-            <p:cNvPr id="108" name="Google Shape;108;p18"/>
-            <p:cNvSpPr/>
-            <p:nvPr/>
-          </p:nvSpPr>
-          <p:spPr>
-            <a:xfrm>
-              <a:off x="6811575" y="2463675"/>
-              <a:ext cx="95275" cy="160600"/>
-            </a:xfrm>
-            <a:custGeom>
-              <a:avLst/>
-              <a:gdLst/>
-              <a:ahLst/>
-              <a:cxnLst/>
-              <a:rect l="l" t="t" r="r" b="b"/>
-              <a:pathLst>
-                <a:path w="3811" h="6424" extrusionOk="0">
-                  <a:moveTo>
-                    <a:pt x="1905" y="0"/>
-                  </a:moveTo>
-                  <a:lnTo>
-                    <a:pt x="928" y="831"/>
-                  </a:lnTo>
-                  <a:lnTo>
-                    <a:pt x="855" y="879"/>
-                  </a:lnTo>
-                  <a:lnTo>
-                    <a:pt x="782" y="904"/>
-                  </a:lnTo>
-                  <a:lnTo>
-                    <a:pt x="684" y="879"/>
-                  </a:lnTo>
-                  <a:lnTo>
-                    <a:pt x="611" y="831"/>
-                  </a:lnTo>
-                  <a:lnTo>
-                    <a:pt x="0" y="318"/>
-                  </a:lnTo>
-                  <a:lnTo>
-                    <a:pt x="1319" y="6423"/>
-                  </a:lnTo>
-                  <a:lnTo>
-                    <a:pt x="2491" y="6423"/>
-                  </a:lnTo>
-                  <a:lnTo>
-                    <a:pt x="3810" y="318"/>
-                  </a:lnTo>
-                  <a:lnTo>
-                    <a:pt x="3200" y="831"/>
-                  </a:lnTo>
-                  <a:lnTo>
-                    <a:pt x="3126" y="879"/>
-                  </a:lnTo>
-                  <a:lnTo>
-                    <a:pt x="3029" y="904"/>
-                  </a:lnTo>
-                  <a:lnTo>
-                    <a:pt x="2955" y="879"/>
-                  </a:lnTo>
-                  <a:lnTo>
-                    <a:pt x="2882" y="831"/>
-                  </a:lnTo>
-                  <a:lnTo>
-                    <a:pt x="1905" y="0"/>
-                  </a:lnTo>
-                  <a:close/>
-                </a:path>
-              </a:pathLst>
-            </a:custGeom>
-            <a:solidFill>
-              <a:srgbClr val="FF9E00"/>
-            </a:solidFill>
-            <a:ln>
-              <a:noFill/>
-            </a:ln>
-          </p:spPr>
-          <p:txBody>
-            <a:bodyPr spcFirstLastPara="1" wrap="square" lIns="91425" tIns="91425" rIns="91425" bIns="91425" anchor="ctr" anchorCtr="0">
-              <a:noAutofit/>
-            </a:bodyPr>
-            <a:lstStyle/>
-            <a:p>
-              <a:pPr marL="0" lvl="0" indent="0" algn="l" rtl="0">
-                <a:spcBef>
-                  <a:spcPts val="0"/>
-                </a:spcBef>
-                <a:spcAft>
-                  <a:spcPts val="0"/>
-                </a:spcAft>
-                <a:buNone/>
-              </a:pPr>
-              <a:endParaRPr>
-                <a:solidFill>
-                  <a:srgbClr val="FFFFFF"/>
-                </a:solidFill>
-              </a:endParaRPr>
-            </a:p>
-          </p:txBody>
-        </p:sp>
-        <p:sp>
-          <p:nvSpPr>
-            <p:cNvPr id="109" name="Google Shape;109;p18"/>
-            <p:cNvSpPr/>
-            <p:nvPr/>
-          </p:nvSpPr>
-          <p:spPr>
-            <a:xfrm>
-              <a:off x="6730350" y="2315900"/>
-              <a:ext cx="257700" cy="308375"/>
-            </a:xfrm>
-            <a:custGeom>
-              <a:avLst/>
-              <a:gdLst/>
-              <a:ahLst/>
-              <a:cxnLst/>
-              <a:rect l="l" t="t" r="r" b="b"/>
-              <a:pathLst>
-                <a:path w="10308" h="12335" extrusionOk="0">
-                  <a:moveTo>
-                    <a:pt x="5154" y="1"/>
-                  </a:moveTo>
-                  <a:lnTo>
-                    <a:pt x="4617" y="25"/>
-                  </a:lnTo>
-                  <a:lnTo>
-                    <a:pt x="4128" y="98"/>
-                  </a:lnTo>
-                  <a:lnTo>
-                    <a:pt x="3615" y="245"/>
-                  </a:lnTo>
-                  <a:lnTo>
-                    <a:pt x="3151" y="416"/>
-                  </a:lnTo>
-                  <a:lnTo>
-                    <a:pt x="2712" y="636"/>
-                  </a:lnTo>
-                  <a:lnTo>
-                    <a:pt x="2272" y="880"/>
-                  </a:lnTo>
-                  <a:lnTo>
-                    <a:pt x="1881" y="1173"/>
-                  </a:lnTo>
-                  <a:lnTo>
-                    <a:pt x="1515" y="1515"/>
-                  </a:lnTo>
-                  <a:lnTo>
-                    <a:pt x="1198" y="1881"/>
-                  </a:lnTo>
-                  <a:lnTo>
-                    <a:pt x="880" y="2272"/>
-                  </a:lnTo>
-                  <a:lnTo>
-                    <a:pt x="636" y="2687"/>
-                  </a:lnTo>
-                  <a:lnTo>
-                    <a:pt x="416" y="3151"/>
-                  </a:lnTo>
-                  <a:lnTo>
-                    <a:pt x="245" y="3615"/>
-                  </a:lnTo>
-                  <a:lnTo>
-                    <a:pt x="123" y="4104"/>
-                  </a:lnTo>
-                  <a:lnTo>
-                    <a:pt x="50" y="4617"/>
-                  </a:lnTo>
-                  <a:lnTo>
-                    <a:pt x="1" y="5154"/>
-                  </a:lnTo>
-                  <a:lnTo>
-                    <a:pt x="25" y="5423"/>
-                  </a:lnTo>
-                  <a:lnTo>
-                    <a:pt x="50" y="5691"/>
-                  </a:lnTo>
-                  <a:lnTo>
-                    <a:pt x="123" y="6204"/>
-                  </a:lnTo>
-                  <a:lnTo>
-                    <a:pt x="245" y="6693"/>
-                  </a:lnTo>
-                  <a:lnTo>
-                    <a:pt x="416" y="7132"/>
-                  </a:lnTo>
-                  <a:lnTo>
-                    <a:pt x="636" y="7572"/>
-                  </a:lnTo>
-                  <a:lnTo>
-                    <a:pt x="856" y="7963"/>
-                  </a:lnTo>
-                  <a:lnTo>
-                    <a:pt x="1100" y="8353"/>
-                  </a:lnTo>
-                  <a:lnTo>
-                    <a:pt x="1369" y="8744"/>
-                  </a:lnTo>
-                  <a:lnTo>
-                    <a:pt x="1906" y="9526"/>
-                  </a:lnTo>
-                  <a:lnTo>
-                    <a:pt x="2150" y="9941"/>
-                  </a:lnTo>
-                  <a:lnTo>
-                    <a:pt x="2394" y="10356"/>
-                  </a:lnTo>
-                  <a:lnTo>
-                    <a:pt x="2614" y="10796"/>
-                  </a:lnTo>
-                  <a:lnTo>
-                    <a:pt x="2810" y="11284"/>
-                  </a:lnTo>
-                  <a:lnTo>
-                    <a:pt x="2980" y="11797"/>
-                  </a:lnTo>
-                  <a:lnTo>
-                    <a:pt x="3103" y="12334"/>
-                  </a:lnTo>
-                  <a:lnTo>
-                    <a:pt x="4079" y="12334"/>
-                  </a:lnTo>
-                  <a:lnTo>
-                    <a:pt x="3249" y="8500"/>
-                  </a:lnTo>
-                  <a:lnTo>
-                    <a:pt x="2663" y="5642"/>
-                  </a:lnTo>
-                  <a:lnTo>
-                    <a:pt x="2663" y="5520"/>
-                  </a:lnTo>
-                  <a:lnTo>
-                    <a:pt x="2712" y="5423"/>
-                  </a:lnTo>
-                  <a:lnTo>
-                    <a:pt x="2785" y="5374"/>
-                  </a:lnTo>
-                  <a:lnTo>
-                    <a:pt x="2883" y="5349"/>
-                  </a:lnTo>
-                  <a:lnTo>
-                    <a:pt x="2956" y="5349"/>
-                  </a:lnTo>
-                  <a:lnTo>
-                    <a:pt x="3054" y="5398"/>
-                  </a:lnTo>
-                  <a:lnTo>
-                    <a:pt x="4031" y="6253"/>
-                  </a:lnTo>
-                  <a:lnTo>
-                    <a:pt x="4983" y="5398"/>
-                  </a:lnTo>
-                  <a:lnTo>
-                    <a:pt x="5081" y="5349"/>
-                  </a:lnTo>
-                  <a:lnTo>
-                    <a:pt x="5227" y="5349"/>
-                  </a:lnTo>
-                  <a:lnTo>
-                    <a:pt x="5325" y="5398"/>
-                  </a:lnTo>
-                  <a:lnTo>
-                    <a:pt x="6278" y="6253"/>
-                  </a:lnTo>
-                  <a:lnTo>
-                    <a:pt x="7254" y="5398"/>
-                  </a:lnTo>
-                  <a:lnTo>
-                    <a:pt x="7352" y="5349"/>
-                  </a:lnTo>
-                  <a:lnTo>
-                    <a:pt x="7425" y="5349"/>
-                  </a:lnTo>
-                  <a:lnTo>
-                    <a:pt x="7523" y="5374"/>
-                  </a:lnTo>
-                  <a:lnTo>
-                    <a:pt x="7596" y="5423"/>
-                  </a:lnTo>
-                  <a:lnTo>
-                    <a:pt x="7645" y="5520"/>
-                  </a:lnTo>
-                  <a:lnTo>
-                    <a:pt x="7645" y="5642"/>
-                  </a:lnTo>
-                  <a:lnTo>
-                    <a:pt x="7059" y="8500"/>
-                  </a:lnTo>
-                  <a:lnTo>
-                    <a:pt x="6229" y="12334"/>
-                  </a:lnTo>
-                  <a:lnTo>
-                    <a:pt x="7206" y="12334"/>
-                  </a:lnTo>
-                  <a:lnTo>
-                    <a:pt x="7328" y="11797"/>
-                  </a:lnTo>
-                  <a:lnTo>
-                    <a:pt x="7499" y="11284"/>
-                  </a:lnTo>
-                  <a:lnTo>
-                    <a:pt x="7694" y="10796"/>
-                  </a:lnTo>
-                  <a:lnTo>
-                    <a:pt x="7914" y="10356"/>
-                  </a:lnTo>
-                  <a:lnTo>
-                    <a:pt x="8158" y="9941"/>
-                  </a:lnTo>
-                  <a:lnTo>
-                    <a:pt x="8402" y="9526"/>
-                  </a:lnTo>
-                  <a:lnTo>
-                    <a:pt x="8940" y="8744"/>
-                  </a:lnTo>
-                  <a:lnTo>
-                    <a:pt x="9208" y="8353"/>
-                  </a:lnTo>
-                  <a:lnTo>
-                    <a:pt x="9453" y="7963"/>
-                  </a:lnTo>
-                  <a:lnTo>
-                    <a:pt x="9672" y="7572"/>
-                  </a:lnTo>
-                  <a:lnTo>
-                    <a:pt x="9892" y="7132"/>
-                  </a:lnTo>
-                  <a:lnTo>
-                    <a:pt x="10063" y="6693"/>
-                  </a:lnTo>
-                  <a:lnTo>
-                    <a:pt x="10185" y="6204"/>
-                  </a:lnTo>
-                  <a:lnTo>
-                    <a:pt x="10259" y="5691"/>
-                  </a:lnTo>
-                  <a:lnTo>
-                    <a:pt x="10283" y="5423"/>
-                  </a:lnTo>
-                  <a:lnTo>
-                    <a:pt x="10307" y="5154"/>
-                  </a:lnTo>
-                  <a:lnTo>
-                    <a:pt x="10259" y="4617"/>
-                  </a:lnTo>
-                  <a:lnTo>
-                    <a:pt x="10185" y="4104"/>
-                  </a:lnTo>
-                  <a:lnTo>
-                    <a:pt x="10063" y="3615"/>
-                  </a:lnTo>
-                  <a:lnTo>
-                    <a:pt x="9892" y="3151"/>
-                  </a:lnTo>
-                  <a:lnTo>
-                    <a:pt x="9672" y="2687"/>
-                  </a:lnTo>
-                  <a:lnTo>
-                    <a:pt x="9428" y="2272"/>
-                  </a:lnTo>
-                  <a:lnTo>
-                    <a:pt x="9111" y="1881"/>
-                  </a:lnTo>
-                  <a:lnTo>
-                    <a:pt x="8793" y="1515"/>
-                  </a:lnTo>
-                  <a:lnTo>
-                    <a:pt x="8427" y="1173"/>
-                  </a:lnTo>
-                  <a:lnTo>
-                    <a:pt x="8036" y="880"/>
-                  </a:lnTo>
-                  <a:lnTo>
-                    <a:pt x="7596" y="636"/>
-                  </a:lnTo>
-                  <a:lnTo>
-                    <a:pt x="7157" y="416"/>
-                  </a:lnTo>
-                  <a:lnTo>
-                    <a:pt x="6693" y="245"/>
-                  </a:lnTo>
-                  <a:lnTo>
-                    <a:pt x="6180" y="98"/>
-                  </a:lnTo>
-                  <a:lnTo>
-                    <a:pt x="5691" y="25"/>
-                  </a:lnTo>
-                  <a:lnTo>
-                    <a:pt x="5154" y="1"/>
-                  </a:lnTo>
-                  <a:close/>
-                </a:path>
-              </a:pathLst>
-            </a:custGeom>
-            <a:solidFill>
-              <a:srgbClr val="FF9E00"/>
-            </a:solidFill>
-            <a:ln>
-              <a:noFill/>
-            </a:ln>
-          </p:spPr>
-          <p:txBody>
-            <a:bodyPr spcFirstLastPara="1" wrap="square" lIns="91425" tIns="91425" rIns="91425" bIns="91425" anchor="ctr" anchorCtr="0">
-              <a:noAutofit/>
-            </a:bodyPr>
-            <a:lstStyle/>
-            <a:p>
-              <a:pPr marL="0" lvl="0" indent="0" algn="l" rtl="0">
-                <a:spcBef>
-                  <a:spcPts val="0"/>
-                </a:spcBef>
-                <a:spcAft>
-                  <a:spcPts val="0"/>
-                </a:spcAft>
-                <a:buNone/>
-              </a:pPr>
-              <a:endParaRPr>
-                <a:solidFill>
-                  <a:srgbClr val="FFFFFF"/>
-                </a:solidFill>
-              </a:endParaRPr>
-            </a:p>
-          </p:txBody>
-        </p:sp>
-      </p:grpSp>
+      </p:pic>
       <p:sp>
         <p:nvSpPr>
-          <p:cNvPr id="9" name="Google Shape;83;p15"/>
+          <p:cNvPr id="11" name="텍스트 상자 10"/>
           <p:cNvSpPr txBox="1"/>
           <p:nvPr/>
         </p:nvSpPr>
         <p:spPr>
           <a:xfrm>
-            <a:off x="1433790" y="1539550"/>
-            <a:ext cx="6545974" cy="2832400"/>
+            <a:off x="1056906" y="745491"/>
+            <a:ext cx="984143" cy="630942"/>
+          </a:xfrm>
+          <a:prstGeom prst="rect">
+            <a:avLst/>
+          </a:prstGeom>
+          <a:noFill/>
+        </p:spPr>
+        <p:txBody>
+          <a:bodyPr wrap="square" rtlCol="0">
+            <a:spAutoFit/>
+          </a:bodyPr>
+          <a:lstStyle/>
+          <a:p>
+            <a:r>
+              <a:rPr kumimoji="1" lang="en-US" altLang="ko-KR" sz="3500" b="1" dirty="0">
+                <a:ln>
+                  <a:solidFill>
+                    <a:schemeClr val="accent1">
+                      <a:alpha val="0"/>
+                    </a:schemeClr>
+                  </a:solidFill>
+                </a:ln>
+                <a:solidFill>
+                  <a:srgbClr val="FF9E00"/>
+                </a:solidFill>
+                <a:latin typeface="KoPub돋움체 Bold" panose="00000800000000000000" pitchFamily="2" charset="-127"/>
+                <a:ea typeface="KoPub돋움체 Bold" panose="00000800000000000000" pitchFamily="2" charset="-127"/>
+                <a:cs typeface="KoPubDotum_Pro" charset="-127"/>
+              </a:rPr>
+              <a:t>01</a:t>
+            </a:r>
+            <a:endParaRPr kumimoji="1" lang="ko-KR" altLang="en-US" sz="3500" b="1" dirty="0">
+              <a:ln>
+                <a:solidFill>
+                  <a:schemeClr val="accent1">
+                    <a:alpha val="0"/>
+                  </a:schemeClr>
+                </a:solidFill>
+              </a:ln>
+              <a:solidFill>
+                <a:srgbClr val="FF9E00"/>
+              </a:solidFill>
+              <a:latin typeface="KoPub돋움체 Bold" panose="00000800000000000000" pitchFamily="2" charset="-127"/>
+              <a:ea typeface="KoPub돋움체 Bold" panose="00000800000000000000" pitchFamily="2" charset="-127"/>
+              <a:cs typeface="KoPubDotum_Pro" charset="-127"/>
+            </a:endParaRPr>
+          </a:p>
+        </p:txBody>
+      </p:sp>
+      <p:sp>
+        <p:nvSpPr>
+          <p:cNvPr id="12" name="텍스트 상자 11"/>
+          <p:cNvSpPr txBox="1"/>
+          <p:nvPr/>
+        </p:nvSpPr>
+        <p:spPr>
+          <a:xfrm>
+            <a:off x="1056906" y="1530374"/>
+            <a:ext cx="984143" cy="630942"/>
+          </a:xfrm>
+          <a:prstGeom prst="rect">
+            <a:avLst/>
+          </a:prstGeom>
+          <a:noFill/>
+        </p:spPr>
+        <p:txBody>
+          <a:bodyPr wrap="square" rtlCol="0">
+            <a:spAutoFit/>
+          </a:bodyPr>
+          <a:lstStyle/>
+          <a:p>
+            <a:r>
+              <a:rPr kumimoji="1" lang="en-US" altLang="ko-KR" sz="3500" b="1" dirty="0">
+                <a:ln>
+                  <a:solidFill>
+                    <a:schemeClr val="accent1">
+                      <a:alpha val="0"/>
+                    </a:schemeClr>
+                  </a:solidFill>
+                </a:ln>
+                <a:solidFill>
+                  <a:srgbClr val="FF9E00"/>
+                </a:solidFill>
+                <a:latin typeface="KoPub돋움체 Bold" panose="00000800000000000000" pitchFamily="2" charset="-127"/>
+                <a:ea typeface="KoPub돋움체 Bold" panose="00000800000000000000" pitchFamily="2" charset="-127"/>
+                <a:cs typeface="KoPubDotum_Pro" charset="-127"/>
+              </a:rPr>
+              <a:t>02</a:t>
+            </a:r>
+            <a:endParaRPr kumimoji="1" lang="ko-KR" altLang="en-US" sz="3500" b="1" dirty="0">
+              <a:ln>
+                <a:solidFill>
+                  <a:schemeClr val="accent1">
+                    <a:alpha val="0"/>
+                  </a:schemeClr>
+                </a:solidFill>
+              </a:ln>
+              <a:solidFill>
+                <a:srgbClr val="FF9E00"/>
+              </a:solidFill>
+              <a:latin typeface="KoPub돋움체 Bold" panose="00000800000000000000" pitchFamily="2" charset="-127"/>
+              <a:ea typeface="KoPub돋움체 Bold" panose="00000800000000000000" pitchFamily="2" charset="-127"/>
+              <a:cs typeface="KoPubDotum_Pro" charset="-127"/>
+            </a:endParaRPr>
+          </a:p>
+        </p:txBody>
+      </p:sp>
+      <p:sp>
+        <p:nvSpPr>
+          <p:cNvPr id="13" name="텍스트 상자 12"/>
+          <p:cNvSpPr txBox="1"/>
+          <p:nvPr/>
+        </p:nvSpPr>
+        <p:spPr>
+          <a:xfrm>
+            <a:off x="1056906" y="2315257"/>
+            <a:ext cx="984143" cy="630942"/>
+          </a:xfrm>
+          <a:prstGeom prst="rect">
+            <a:avLst/>
+          </a:prstGeom>
+          <a:noFill/>
+        </p:spPr>
+        <p:txBody>
+          <a:bodyPr wrap="square" rtlCol="0">
+            <a:spAutoFit/>
+          </a:bodyPr>
+          <a:lstStyle/>
+          <a:p>
+            <a:r>
+              <a:rPr kumimoji="1" lang="en-US" altLang="ko-KR" sz="3500" b="1" dirty="0">
+                <a:ln>
+                  <a:solidFill>
+                    <a:schemeClr val="accent1">
+                      <a:alpha val="0"/>
+                    </a:schemeClr>
+                  </a:solidFill>
+                </a:ln>
+                <a:solidFill>
+                  <a:srgbClr val="FF9E00"/>
+                </a:solidFill>
+                <a:latin typeface="KoPub돋움체 Bold" panose="00000800000000000000" pitchFamily="2" charset="-127"/>
+                <a:ea typeface="KoPub돋움체 Bold" panose="00000800000000000000" pitchFamily="2" charset="-127"/>
+                <a:cs typeface="KoPubDotum_Pro" charset="-127"/>
+              </a:rPr>
+              <a:t>03</a:t>
+            </a:r>
+            <a:endParaRPr kumimoji="1" lang="ko-KR" altLang="en-US" sz="3500" b="1" dirty="0">
+              <a:ln>
+                <a:solidFill>
+                  <a:schemeClr val="accent1">
+                    <a:alpha val="0"/>
+                  </a:schemeClr>
+                </a:solidFill>
+              </a:ln>
+              <a:solidFill>
+                <a:srgbClr val="FF9E00"/>
+              </a:solidFill>
+              <a:latin typeface="KoPub돋움체 Bold" panose="00000800000000000000" pitchFamily="2" charset="-127"/>
+              <a:ea typeface="KoPub돋움체 Bold" panose="00000800000000000000" pitchFamily="2" charset="-127"/>
+              <a:cs typeface="KoPubDotum_Pro" charset="-127"/>
+            </a:endParaRPr>
+          </a:p>
+        </p:txBody>
+      </p:sp>
+      <p:sp>
+        <p:nvSpPr>
+          <p:cNvPr id="17" name="텍스트 상자 16"/>
+          <p:cNvSpPr txBox="1"/>
+          <p:nvPr/>
+        </p:nvSpPr>
+        <p:spPr>
+          <a:xfrm>
+            <a:off x="1056906" y="3100140"/>
+            <a:ext cx="984143" cy="630942"/>
+          </a:xfrm>
+          <a:prstGeom prst="rect">
+            <a:avLst/>
+          </a:prstGeom>
+          <a:noFill/>
+        </p:spPr>
+        <p:txBody>
+          <a:bodyPr wrap="square" rtlCol="0">
+            <a:spAutoFit/>
+          </a:bodyPr>
+          <a:lstStyle/>
+          <a:p>
+            <a:r>
+              <a:rPr kumimoji="1" lang="en-US" altLang="ko-KR" sz="3500" b="1" dirty="0">
+                <a:ln>
+                  <a:solidFill>
+                    <a:schemeClr val="accent1">
+                      <a:alpha val="0"/>
+                    </a:schemeClr>
+                  </a:solidFill>
+                </a:ln>
+                <a:solidFill>
+                  <a:srgbClr val="FF9E00"/>
+                </a:solidFill>
+                <a:latin typeface="KoPub돋움체 Bold" panose="00000800000000000000" pitchFamily="2" charset="-127"/>
+                <a:ea typeface="KoPub돋움체 Bold" panose="00000800000000000000" pitchFamily="2" charset="-127"/>
+                <a:cs typeface="KoPubDotum_Pro" charset="-127"/>
+              </a:rPr>
+              <a:t>04</a:t>
+            </a:r>
+            <a:endParaRPr kumimoji="1" lang="ko-KR" altLang="en-US" sz="3500" b="1" dirty="0">
+              <a:ln>
+                <a:solidFill>
+                  <a:schemeClr val="accent1">
+                    <a:alpha val="0"/>
+                  </a:schemeClr>
+                </a:solidFill>
+              </a:ln>
+              <a:solidFill>
+                <a:srgbClr val="FF9E00"/>
+              </a:solidFill>
+              <a:latin typeface="KoPub돋움체 Bold" panose="00000800000000000000" pitchFamily="2" charset="-127"/>
+              <a:ea typeface="KoPub돋움체 Bold" panose="00000800000000000000" pitchFamily="2" charset="-127"/>
+              <a:cs typeface="KoPubDotum_Pro" charset="-127"/>
+            </a:endParaRPr>
+          </a:p>
+        </p:txBody>
+      </p:sp>
+      <p:sp>
+        <p:nvSpPr>
+          <p:cNvPr id="18" name="텍스트 상자 17"/>
+          <p:cNvSpPr txBox="1"/>
+          <p:nvPr/>
+        </p:nvSpPr>
+        <p:spPr>
+          <a:xfrm>
+            <a:off x="1809424" y="912319"/>
+            <a:ext cx="2145056" cy="353943"/>
+          </a:xfrm>
+          <a:prstGeom prst="rect">
+            <a:avLst/>
+          </a:prstGeom>
+          <a:noFill/>
+        </p:spPr>
+        <p:txBody>
+          <a:bodyPr wrap="square" rtlCol="0">
+            <a:spAutoFit/>
+          </a:bodyPr>
+          <a:lstStyle/>
+          <a:p>
+            <a:r>
+              <a:rPr kumimoji="1" lang="ko-KR" altLang="en-US" sz="1700" b="1" dirty="0">
+                <a:ln>
+                  <a:solidFill>
+                    <a:schemeClr val="accent1">
+                      <a:alpha val="0"/>
+                    </a:schemeClr>
+                  </a:solidFill>
+                </a:ln>
+                <a:solidFill>
+                  <a:schemeClr val="bg1"/>
+                </a:solidFill>
+                <a:latin typeface="나눔바른고딕" panose="020B0603020101020101" pitchFamily="50" charset="-127"/>
+                <a:ea typeface="나눔바른고딕" panose="020B0603020101020101" pitchFamily="50" charset="-127"/>
+                <a:cs typeface="KoPubDotum_Pro" charset="-127"/>
+              </a:rPr>
+              <a:t>프로젝트 개요 </a:t>
+            </a:r>
+            <a:endParaRPr kumimoji="1" lang="ko-KR" altLang="en-US" sz="1700" b="1" dirty="0">
+              <a:ln>
+                <a:solidFill>
+                  <a:schemeClr val="accent1">
+                    <a:alpha val="0"/>
+                  </a:schemeClr>
+                </a:solidFill>
+              </a:ln>
+              <a:solidFill>
+                <a:schemeClr val="bg1"/>
+              </a:solidFill>
+              <a:latin typeface="나눔바른고딕" panose="020B0603020101020101" pitchFamily="50" charset="-127"/>
+              <a:ea typeface="나눔바른고딕" panose="020B0603020101020101" pitchFamily="50" charset="-127"/>
+              <a:cs typeface="KoPubDotum_Pro" charset="-127"/>
+            </a:endParaRPr>
+          </a:p>
+        </p:txBody>
+      </p:sp>
+      <p:sp>
+        <p:nvSpPr>
+          <p:cNvPr id="19" name="텍스트 상자 18"/>
+          <p:cNvSpPr txBox="1"/>
+          <p:nvPr/>
+        </p:nvSpPr>
+        <p:spPr>
+          <a:xfrm>
+            <a:off x="1809424" y="1697202"/>
+            <a:ext cx="2762576" cy="353943"/>
+          </a:xfrm>
+          <a:prstGeom prst="rect">
+            <a:avLst/>
+          </a:prstGeom>
+          <a:noFill/>
+        </p:spPr>
+        <p:txBody>
+          <a:bodyPr wrap="square" rtlCol="0">
+            <a:spAutoFit/>
+          </a:bodyPr>
+          <a:lstStyle/>
+          <a:p>
+            <a:r>
+              <a:rPr kumimoji="1" lang="ko-KR" altLang="en-US" sz="1700" b="1" dirty="0" err="1">
+                <a:ln>
+                  <a:solidFill>
+                    <a:schemeClr val="accent1">
+                      <a:alpha val="0"/>
+                    </a:schemeClr>
+                  </a:solidFill>
+                </a:ln>
+                <a:solidFill>
+                  <a:schemeClr val="bg1"/>
+                </a:solidFill>
+                <a:latin typeface="나눔바른고딕" panose="020B0603020101020101" pitchFamily="50" charset="-127"/>
+                <a:ea typeface="나눔바른고딕" panose="020B0603020101020101" pitchFamily="50" charset="-127"/>
+                <a:cs typeface="KoPubDotum_Pro" charset="-127"/>
+              </a:rPr>
+              <a:t>유즈케이스</a:t>
+            </a:r>
+            <a:endParaRPr kumimoji="1" lang="ko-KR" altLang="en-US" sz="1700" b="1" dirty="0">
+              <a:ln>
+                <a:solidFill>
+                  <a:schemeClr val="accent1">
+                    <a:alpha val="0"/>
+                  </a:schemeClr>
+                </a:solidFill>
+              </a:ln>
+              <a:solidFill>
+                <a:schemeClr val="bg1"/>
+              </a:solidFill>
+              <a:latin typeface="나눔바른고딕" panose="020B0603020101020101" pitchFamily="50" charset="-127"/>
+              <a:ea typeface="나눔바른고딕" panose="020B0603020101020101" pitchFamily="50" charset="-127"/>
+              <a:cs typeface="KoPubDotum_Pro" charset="-127"/>
+            </a:endParaRPr>
+          </a:p>
+        </p:txBody>
+      </p:sp>
+      <p:sp>
+        <p:nvSpPr>
+          <p:cNvPr id="20" name="텍스트 상자 19"/>
+          <p:cNvSpPr txBox="1"/>
+          <p:nvPr/>
+        </p:nvSpPr>
+        <p:spPr>
+          <a:xfrm>
+            <a:off x="1809424" y="2482085"/>
+            <a:ext cx="2145056" cy="353943"/>
+          </a:xfrm>
+          <a:prstGeom prst="rect">
+            <a:avLst/>
+          </a:prstGeom>
+          <a:noFill/>
+        </p:spPr>
+        <p:txBody>
+          <a:bodyPr wrap="square" rtlCol="0">
+            <a:spAutoFit/>
+          </a:bodyPr>
+          <a:lstStyle/>
+          <a:p>
+            <a:r>
+              <a:rPr kumimoji="1" lang="ko-KR" altLang="en-US" sz="1700" b="1" dirty="0">
+                <a:ln>
+                  <a:solidFill>
+                    <a:schemeClr val="accent1">
+                      <a:alpha val="0"/>
+                    </a:schemeClr>
+                  </a:solidFill>
+                </a:ln>
+                <a:solidFill>
+                  <a:schemeClr val="bg1"/>
+                </a:solidFill>
+                <a:latin typeface="나눔바른고딕" panose="020B0603020101020101" pitchFamily="50" charset="-127"/>
+                <a:ea typeface="나눔바른고딕" panose="020B0603020101020101" pitchFamily="50" charset="-127"/>
+                <a:cs typeface="KoPubDotum_Pro" charset="-127"/>
+              </a:rPr>
+              <a:t>요구사항 정의서</a:t>
+            </a:r>
+            <a:endParaRPr kumimoji="1" lang="ko-KR" altLang="en-US" sz="1700" b="1" dirty="0">
+              <a:ln>
+                <a:solidFill>
+                  <a:schemeClr val="accent1">
+                    <a:alpha val="0"/>
+                  </a:schemeClr>
+                </a:solidFill>
+              </a:ln>
+              <a:solidFill>
+                <a:schemeClr val="bg1"/>
+              </a:solidFill>
+              <a:latin typeface="나눔바른고딕" panose="020B0603020101020101" pitchFamily="50" charset="-127"/>
+              <a:ea typeface="나눔바른고딕" panose="020B0603020101020101" pitchFamily="50" charset="-127"/>
+              <a:cs typeface="KoPubDotum_Pro" charset="-127"/>
+            </a:endParaRPr>
+          </a:p>
+        </p:txBody>
+      </p:sp>
+      <p:sp>
+        <p:nvSpPr>
+          <p:cNvPr id="21" name="텍스트 상자 20"/>
+          <p:cNvSpPr txBox="1"/>
+          <p:nvPr/>
+        </p:nvSpPr>
+        <p:spPr>
+          <a:xfrm>
+            <a:off x="1809424" y="3266968"/>
+            <a:ext cx="2592292" cy="353943"/>
+          </a:xfrm>
+          <a:prstGeom prst="rect">
+            <a:avLst/>
+          </a:prstGeom>
+          <a:noFill/>
+        </p:spPr>
+        <p:txBody>
+          <a:bodyPr wrap="square" rtlCol="0">
+            <a:spAutoFit/>
+          </a:bodyPr>
+          <a:lstStyle/>
+          <a:p>
+            <a:r>
+              <a:rPr kumimoji="1" lang="en-US" altLang="ko-KR" sz="1700" b="1" dirty="0">
+                <a:ln>
+                  <a:solidFill>
+                    <a:schemeClr val="accent1">
+                      <a:alpha val="0"/>
+                    </a:schemeClr>
+                  </a:solidFill>
+                </a:ln>
+                <a:solidFill>
+                  <a:schemeClr val="bg1"/>
+                </a:solidFill>
+                <a:latin typeface="나눔바른고딕" panose="020B0603020101020101" pitchFamily="50" charset="-127"/>
+                <a:ea typeface="나눔바른고딕" panose="020B0603020101020101" pitchFamily="50" charset="-127"/>
+                <a:cs typeface="KoPubDotum_Pro" charset="-127"/>
+              </a:rPr>
+              <a:t>[DB </a:t>
+            </a:r>
+            <a:r>
+              <a:rPr kumimoji="1" lang="ko-KR" altLang="en-US" sz="1700" b="1" dirty="0">
+                <a:ln>
+                  <a:solidFill>
+                    <a:schemeClr val="accent1">
+                      <a:alpha val="0"/>
+                    </a:schemeClr>
+                  </a:solidFill>
+                </a:ln>
+                <a:solidFill>
+                  <a:schemeClr val="bg1"/>
+                </a:solidFill>
+                <a:latin typeface="나눔바른고딕" panose="020B0603020101020101" pitchFamily="50" charset="-127"/>
+                <a:ea typeface="나눔바른고딕" panose="020B0603020101020101" pitchFamily="50" charset="-127"/>
+                <a:cs typeface="KoPubDotum_Pro" charset="-127"/>
+              </a:rPr>
+              <a:t>설계</a:t>
+            </a:r>
+            <a:r>
+              <a:rPr kumimoji="1" lang="en-US" altLang="ko-KR" sz="1700" b="1" dirty="0">
+                <a:ln>
+                  <a:solidFill>
+                    <a:schemeClr val="accent1">
+                      <a:alpha val="0"/>
+                    </a:schemeClr>
+                  </a:solidFill>
+                </a:ln>
+                <a:solidFill>
+                  <a:schemeClr val="bg1"/>
+                </a:solidFill>
+                <a:latin typeface="나눔바른고딕" panose="020B0603020101020101" pitchFamily="50" charset="-127"/>
+                <a:ea typeface="나눔바른고딕" panose="020B0603020101020101" pitchFamily="50" charset="-127"/>
+                <a:cs typeface="KoPubDotum_Pro" charset="-127"/>
+              </a:rPr>
+              <a:t>] ERD </a:t>
+            </a:r>
+            <a:r>
+              <a:rPr kumimoji="1" lang="ko-KR" altLang="en-US" sz="1700" b="1" dirty="0">
+                <a:ln>
+                  <a:solidFill>
+                    <a:schemeClr val="accent1">
+                      <a:alpha val="0"/>
+                    </a:schemeClr>
+                  </a:solidFill>
+                </a:ln>
+                <a:solidFill>
+                  <a:schemeClr val="bg1"/>
+                </a:solidFill>
+                <a:latin typeface="나눔바른고딕" panose="020B0603020101020101" pitchFamily="50" charset="-127"/>
+                <a:ea typeface="나눔바른고딕" panose="020B0603020101020101" pitchFamily="50" charset="-127"/>
+                <a:cs typeface="KoPubDotum_Pro" charset="-127"/>
+              </a:rPr>
+              <a:t>설계</a:t>
+            </a:r>
+            <a:r>
+              <a:rPr kumimoji="1" lang="en-US" altLang="ko-KR" sz="1700" b="1" dirty="0">
+                <a:ln>
+                  <a:solidFill>
+                    <a:schemeClr val="accent1">
+                      <a:alpha val="0"/>
+                    </a:schemeClr>
+                  </a:solidFill>
+                </a:ln>
+                <a:solidFill>
+                  <a:schemeClr val="bg1"/>
+                </a:solidFill>
+                <a:latin typeface="나눔바른고딕" panose="020B0603020101020101" pitchFamily="50" charset="-127"/>
+                <a:ea typeface="나눔바른고딕" panose="020B0603020101020101" pitchFamily="50" charset="-127"/>
+                <a:cs typeface="KoPubDotum_Pro" charset="-127"/>
+              </a:rPr>
+              <a:t>(</a:t>
+            </a:r>
+            <a:r>
+              <a:rPr kumimoji="1" lang="ko-KR" altLang="en-US" sz="1700" b="1" dirty="0">
+                <a:ln>
+                  <a:solidFill>
+                    <a:schemeClr val="accent1">
+                      <a:alpha val="0"/>
+                    </a:schemeClr>
+                  </a:solidFill>
+                </a:ln>
+                <a:solidFill>
+                  <a:schemeClr val="bg1"/>
+                </a:solidFill>
+                <a:latin typeface="나눔바른고딕" panose="020B0603020101020101" pitchFamily="50" charset="-127"/>
+                <a:ea typeface="나눔바른고딕" panose="020B0603020101020101" pitchFamily="50" charset="-127"/>
+                <a:cs typeface="KoPubDotum_Pro" charset="-127"/>
+              </a:rPr>
+              <a:t>초안</a:t>
+            </a:r>
+            <a:r>
+              <a:rPr kumimoji="1" lang="en-US" altLang="ko-KR" sz="1700" b="1" dirty="0">
+                <a:ln>
+                  <a:solidFill>
+                    <a:schemeClr val="accent1">
+                      <a:alpha val="0"/>
+                    </a:schemeClr>
+                  </a:solidFill>
+                </a:ln>
+                <a:solidFill>
+                  <a:schemeClr val="bg1"/>
+                </a:solidFill>
+                <a:latin typeface="나눔바른고딕" panose="020B0603020101020101" pitchFamily="50" charset="-127"/>
+                <a:ea typeface="나눔바른고딕" panose="020B0603020101020101" pitchFamily="50" charset="-127"/>
+                <a:cs typeface="KoPubDotum_Pro" charset="-127"/>
+              </a:rPr>
+              <a:t>)</a:t>
+            </a:r>
+          </a:p>
+        </p:txBody>
+      </p:sp>
+      <p:sp>
+        <p:nvSpPr>
+          <p:cNvPr id="10" name="텍스트 상자 16"/>
+          <p:cNvSpPr txBox="1"/>
+          <p:nvPr/>
+        </p:nvSpPr>
+        <p:spPr>
+          <a:xfrm>
+            <a:off x="1056906" y="3885024"/>
+            <a:ext cx="984143" cy="630942"/>
+          </a:xfrm>
+          <a:prstGeom prst="rect">
+            <a:avLst/>
+          </a:prstGeom>
+          <a:noFill/>
+        </p:spPr>
+        <p:txBody>
+          <a:bodyPr wrap="square" rtlCol="0">
+            <a:spAutoFit/>
+          </a:bodyPr>
+          <a:lstStyle/>
+          <a:p>
+            <a:r>
+              <a:rPr kumimoji="1" lang="en-US" altLang="ko-KR" sz="3500" b="1" dirty="0" smtClean="0">
+                <a:ln>
+                  <a:solidFill>
+                    <a:schemeClr val="accent1">
+                      <a:alpha val="0"/>
+                    </a:schemeClr>
+                  </a:solidFill>
+                </a:ln>
+                <a:solidFill>
+                  <a:srgbClr val="FF9E00"/>
+                </a:solidFill>
+                <a:latin typeface="KoPub돋움체 Bold" panose="00000800000000000000" pitchFamily="2" charset="-127"/>
+                <a:ea typeface="KoPub돋움체 Bold" panose="00000800000000000000" pitchFamily="2" charset="-127"/>
+                <a:cs typeface="KoPubDotum_Pro" charset="-127"/>
+              </a:rPr>
+              <a:t>05</a:t>
+            </a:r>
+            <a:endParaRPr kumimoji="1" lang="ko-KR" altLang="en-US" sz="3500" b="1" dirty="0">
+              <a:ln>
+                <a:solidFill>
+                  <a:schemeClr val="accent1">
+                    <a:alpha val="0"/>
+                  </a:schemeClr>
+                </a:solidFill>
+              </a:ln>
+              <a:solidFill>
+                <a:srgbClr val="FF9E00"/>
+              </a:solidFill>
+              <a:latin typeface="KoPub돋움체 Bold" panose="00000800000000000000" pitchFamily="2" charset="-127"/>
+              <a:ea typeface="KoPub돋움체 Bold" panose="00000800000000000000" pitchFamily="2" charset="-127"/>
+              <a:cs typeface="KoPubDotum_Pro" charset="-127"/>
+            </a:endParaRPr>
+          </a:p>
+        </p:txBody>
+      </p:sp>
+      <p:sp>
+        <p:nvSpPr>
+          <p:cNvPr id="23" name="텍스트 상자 16"/>
+          <p:cNvSpPr txBox="1"/>
+          <p:nvPr/>
+        </p:nvSpPr>
+        <p:spPr>
+          <a:xfrm>
+            <a:off x="5220072" y="727359"/>
+            <a:ext cx="984143" cy="630942"/>
+          </a:xfrm>
+          <a:prstGeom prst="rect">
+            <a:avLst/>
+          </a:prstGeom>
+          <a:noFill/>
+        </p:spPr>
+        <p:txBody>
+          <a:bodyPr wrap="square" rtlCol="0">
+            <a:spAutoFit/>
+          </a:bodyPr>
+          <a:lstStyle/>
+          <a:p>
+            <a:r>
+              <a:rPr kumimoji="1" lang="en-US" altLang="ko-KR" sz="3500" b="1" dirty="0" smtClean="0">
+                <a:ln>
+                  <a:solidFill>
+                    <a:schemeClr val="accent1">
+                      <a:alpha val="0"/>
+                    </a:schemeClr>
+                  </a:solidFill>
+                </a:ln>
+                <a:solidFill>
+                  <a:srgbClr val="FF9E00"/>
+                </a:solidFill>
+                <a:latin typeface="KoPub돋움체 Bold" panose="00000800000000000000" pitchFamily="2" charset="-127"/>
+                <a:ea typeface="KoPub돋움체 Bold" panose="00000800000000000000" pitchFamily="2" charset="-127"/>
+                <a:cs typeface="KoPubDotum_Pro" charset="-127"/>
+              </a:rPr>
+              <a:t>06</a:t>
+            </a:r>
+            <a:endParaRPr kumimoji="1" lang="ko-KR" altLang="en-US" sz="3500" b="1" dirty="0">
+              <a:ln>
+                <a:solidFill>
+                  <a:schemeClr val="accent1">
+                    <a:alpha val="0"/>
+                  </a:schemeClr>
+                </a:solidFill>
+              </a:ln>
+              <a:solidFill>
+                <a:srgbClr val="FF9E00"/>
+              </a:solidFill>
+              <a:latin typeface="KoPub돋움체 Bold" panose="00000800000000000000" pitchFamily="2" charset="-127"/>
+              <a:ea typeface="KoPub돋움체 Bold" panose="00000800000000000000" pitchFamily="2" charset="-127"/>
+              <a:cs typeface="KoPubDotum_Pro" charset="-127"/>
+            </a:endParaRPr>
+          </a:p>
+        </p:txBody>
+      </p:sp>
+      <p:sp>
+        <p:nvSpPr>
+          <p:cNvPr id="24" name="텍스트 상자 20"/>
+          <p:cNvSpPr txBox="1"/>
+          <p:nvPr/>
+        </p:nvSpPr>
+        <p:spPr>
+          <a:xfrm>
+            <a:off x="5940152" y="780116"/>
+            <a:ext cx="2145057" cy="484748"/>
+          </a:xfrm>
+          <a:prstGeom prst="rect">
+            <a:avLst/>
+          </a:prstGeom>
+          <a:noFill/>
+        </p:spPr>
+        <p:txBody>
+          <a:bodyPr wrap="square" rtlCol="0">
+            <a:spAutoFit/>
+          </a:bodyPr>
+          <a:lstStyle/>
+          <a:p>
+            <a:pPr lvl="0">
+              <a:lnSpc>
+                <a:spcPct val="150000"/>
+              </a:lnSpc>
+            </a:pPr>
+            <a:r>
+              <a:rPr lang="ko-KR" altLang="en-US" sz="1700" dirty="0">
+                <a:solidFill>
+                  <a:srgbClr val="FFFFFF"/>
+                </a:solidFill>
+                <a:latin typeface="나눔바른고딕" panose="020B0603020101020101" pitchFamily="50" charset="-127"/>
+                <a:ea typeface="나눔바른고딕" panose="020B0603020101020101" pitchFamily="50" charset="-127"/>
+                <a:cs typeface="Montserrat"/>
+                <a:sym typeface="Montserrat"/>
+              </a:rPr>
+              <a:t>이번 주 </a:t>
+            </a:r>
+            <a:r>
+              <a:rPr lang="en-US" altLang="ko-KR" sz="1700" b="1" dirty="0" err="1">
+                <a:solidFill>
+                  <a:srgbClr val="FFFFFF"/>
+                </a:solidFill>
+                <a:latin typeface="Microsoft JhengHei" panose="020B0604030504040204" pitchFamily="34" charset="-120"/>
+                <a:ea typeface="Microsoft JhengHei" panose="020B0604030504040204" pitchFamily="34" charset="-120"/>
+                <a:cs typeface="Microsoft New Tai Lue" panose="020B0502040204020203" pitchFamily="34" charset="0"/>
+                <a:sym typeface="Montserrat"/>
+              </a:rPr>
+              <a:t>FeedBack</a:t>
+            </a:r>
+            <a:endParaRPr lang="en-US" altLang="ko-KR" sz="1700" b="1" dirty="0">
+              <a:solidFill>
+                <a:srgbClr val="FFFFFF"/>
+              </a:solidFill>
+              <a:latin typeface="Microsoft JhengHei" panose="020B0604030504040204" pitchFamily="34" charset="-120"/>
+              <a:ea typeface="Microsoft JhengHei" panose="020B0604030504040204" pitchFamily="34" charset="-120"/>
+              <a:cs typeface="Microsoft New Tai Lue" panose="020B0502040204020203" pitchFamily="34" charset="0"/>
+              <a:sym typeface="Montserrat"/>
+            </a:endParaRPr>
+          </a:p>
+        </p:txBody>
+      </p:sp>
+      <p:sp>
+        <p:nvSpPr>
+          <p:cNvPr id="27" name="텍스트 상자 20"/>
+          <p:cNvSpPr txBox="1"/>
+          <p:nvPr/>
+        </p:nvSpPr>
+        <p:spPr>
+          <a:xfrm>
+            <a:off x="1809424" y="4051852"/>
+            <a:ext cx="2592292" cy="353943"/>
+          </a:xfrm>
+          <a:prstGeom prst="rect">
+            <a:avLst/>
+          </a:prstGeom>
+          <a:noFill/>
+        </p:spPr>
+        <p:txBody>
+          <a:bodyPr wrap="square" rtlCol="0">
+            <a:spAutoFit/>
+          </a:bodyPr>
+          <a:lstStyle/>
+          <a:p>
+            <a:r>
+              <a:rPr kumimoji="1" lang="ko-KR" altLang="en-US" sz="1700" b="1" dirty="0" smtClean="0">
+                <a:ln>
+                  <a:solidFill>
+                    <a:schemeClr val="accent1">
+                      <a:alpha val="0"/>
+                    </a:schemeClr>
+                  </a:solidFill>
+                </a:ln>
+                <a:solidFill>
+                  <a:schemeClr val="bg1"/>
+                </a:solidFill>
+                <a:latin typeface="나눔바른고딕" panose="020B0603020101020101" pitchFamily="50" charset="-127"/>
+                <a:ea typeface="나눔바른고딕" panose="020B0603020101020101" pitchFamily="50" charset="-127"/>
+                <a:cs typeface="KoPubDotum_Pro" charset="-127"/>
+              </a:rPr>
+              <a:t>화면 설계</a:t>
+            </a:r>
+            <a:endParaRPr kumimoji="1" lang="en-US" altLang="ko-KR" sz="1700" b="1" dirty="0">
+              <a:ln>
+                <a:solidFill>
+                  <a:schemeClr val="accent1">
+                    <a:alpha val="0"/>
+                  </a:schemeClr>
+                </a:solidFill>
+              </a:ln>
+              <a:solidFill>
+                <a:schemeClr val="bg1"/>
+              </a:solidFill>
+              <a:latin typeface="나눔바른고딕" panose="020B0603020101020101" pitchFamily="50" charset="-127"/>
+              <a:ea typeface="나눔바른고딕" panose="020B0603020101020101" pitchFamily="50" charset="-127"/>
+              <a:cs typeface="KoPubDotum_Pro" charset="-127"/>
+            </a:endParaRPr>
+          </a:p>
+        </p:txBody>
+      </p:sp>
+      <p:sp>
+        <p:nvSpPr>
+          <p:cNvPr id="28" name="Google Shape;102;p18"/>
+          <p:cNvSpPr txBox="1">
+            <a:spLocks/>
+          </p:cNvSpPr>
+          <p:nvPr/>
+        </p:nvSpPr>
+        <p:spPr>
+          <a:xfrm>
+            <a:off x="3689417" y="75899"/>
+            <a:ext cx="1863603" cy="677386"/>
           </a:xfrm>
           <a:prstGeom prst="rect">
             <a:avLst/>
@@ -21409,11 +21553,10 @@
           <a:bodyPr spcFirstLastPara="1" wrap="square" lIns="91425" tIns="91425" rIns="91425" bIns="91425" anchor="t" anchorCtr="0">
             <a:noAutofit/>
           </a:bodyPr>
-          <a:lstStyle/>
-          <a:p>
-            <a:pPr marL="0" lvl="0" indent="0" rtl="0">
+          <a:lstStyle>
+            <a:defPPr marR="0" lvl="0" algn="l" rtl="0">
               <a:lnSpc>
-                <a:spcPct val="150000"/>
+                <a:spcPct val="100000"/>
               </a:lnSpc>
               <a:spcBef>
                 <a:spcPts val="0"/>
@@ -21421,93 +21564,10 @@
               <a:spcAft>
                 <a:spcPts val="0"/>
               </a:spcAft>
-              <a:buNone/>
-            </a:pPr>
-            <a:r>
-              <a:rPr lang="en-US" altLang="ko-KR" sz="2000" b="1" dirty="0" smtClean="0">
-                <a:solidFill>
-                  <a:srgbClr val="FFFFFF"/>
-                </a:solidFill>
-                <a:latin typeface="나눔바른고딕" panose="020B0603020101020101" pitchFamily="50" charset="-127"/>
-                <a:ea typeface="나눔바른고딕" panose="020B0603020101020101" pitchFamily="50" charset="-127"/>
-                <a:cs typeface="Montserrat"/>
-                <a:sym typeface="Montserrat"/>
-              </a:rPr>
-              <a:t>1. </a:t>
-            </a:r>
-            <a:r>
-              <a:rPr lang="ko-KR" altLang="en-US" sz="2000" b="1" dirty="0" smtClean="0">
-                <a:solidFill>
-                  <a:srgbClr val="FFFFFF"/>
-                </a:solidFill>
-                <a:latin typeface="나눔바른고딕" panose="020B0603020101020101" pitchFamily="50" charset="-127"/>
-                <a:ea typeface="나눔바른고딕" panose="020B0603020101020101" pitchFamily="50" charset="-127"/>
-                <a:cs typeface="Montserrat"/>
-                <a:sym typeface="Montserrat"/>
-              </a:rPr>
-              <a:t>프로젝트 개요</a:t>
-            </a:r>
-            <a:r>
-              <a:rPr lang="en-US" altLang="ko-KR" sz="2000" b="1" dirty="0" smtClean="0">
-                <a:solidFill>
-                  <a:srgbClr val="FFFFFF"/>
-                </a:solidFill>
-                <a:latin typeface="나눔바른고딕" panose="020B0603020101020101" pitchFamily="50" charset="-127"/>
-                <a:ea typeface="나눔바른고딕" panose="020B0603020101020101" pitchFamily="50" charset="-127"/>
-                <a:cs typeface="Montserrat"/>
-                <a:sym typeface="Montserrat"/>
-              </a:rPr>
-              <a:t>  </a:t>
-            </a:r>
-            <a:br>
-              <a:rPr lang="en-US" altLang="ko-KR" sz="2000" b="1" dirty="0" smtClean="0">
-                <a:solidFill>
-                  <a:srgbClr val="FFFFFF"/>
-                </a:solidFill>
-                <a:latin typeface="나눔바른고딕" panose="020B0603020101020101" pitchFamily="50" charset="-127"/>
-                <a:ea typeface="나눔바른고딕" panose="020B0603020101020101" pitchFamily="50" charset="-127"/>
-                <a:cs typeface="Montserrat"/>
-                <a:sym typeface="Montserrat"/>
-              </a:rPr>
-            </a:br>
-            <a:r>
-              <a:rPr lang="en-US" altLang="ko-KR" sz="2000" b="1" dirty="0" smtClean="0">
-                <a:solidFill>
-                  <a:srgbClr val="FFFFFF"/>
-                </a:solidFill>
-                <a:latin typeface="나눔바른고딕" panose="020B0603020101020101" pitchFamily="50" charset="-127"/>
-                <a:ea typeface="나눔바른고딕" panose="020B0603020101020101" pitchFamily="50" charset="-127"/>
-                <a:cs typeface="Montserrat"/>
-                <a:sym typeface="Montserrat"/>
-              </a:rPr>
-              <a:t>2. </a:t>
-            </a:r>
-            <a:r>
-              <a:rPr lang="ko-KR" altLang="en-US" sz="2000" b="1" dirty="0" err="1" smtClean="0">
-                <a:solidFill>
-                  <a:srgbClr val="FFFFFF"/>
-                </a:solidFill>
-                <a:latin typeface="나눔바른고딕" panose="020B0603020101020101" pitchFamily="50" charset="-127"/>
-                <a:ea typeface="나눔바른고딕" panose="020B0603020101020101" pitchFamily="50" charset="-127"/>
-                <a:cs typeface="Montserrat"/>
-                <a:sym typeface="Montserrat"/>
-              </a:rPr>
-              <a:t>유즈케이스</a:t>
-            </a:r>
-            <a:endParaRPr lang="en-US" altLang="ko-KR" sz="2000" b="1" dirty="0" smtClean="0">
-              <a:solidFill>
-                <a:srgbClr val="FFFFFF"/>
-              </a:solidFill>
-              <a:latin typeface="나눔바른고딕" panose="020B0603020101020101" pitchFamily="50" charset="-127"/>
-              <a:ea typeface="나눔바른고딕" panose="020B0603020101020101" pitchFamily="50" charset="-127"/>
-              <a:cs typeface="Montserrat"/>
-              <a:sym typeface="Montserrat"/>
-            </a:endParaRPr>
-          </a:p>
-          <a:p>
-            <a:pPr marL="0" lvl="0" indent="0" rtl="0">
+            </a:defPPr>
+            <a:lvl1pPr marR="0" lvl="0" algn="ctr" rtl="0">
               <a:lnSpc>
-                <a:spcPct val="150000"/>
+                <a:spcPct val="100000"/>
               </a:lnSpc>
               <a:spcBef>
                 <a:spcPts val="0"/>
@@ -21515,46 +21575,25 @@
               <a:spcAft>
                 <a:spcPts val="0"/>
               </a:spcAft>
+              <a:buClr>
+                <a:srgbClr val="999999"/>
+              </a:buClr>
+              <a:buSzPts val="1200"/>
+              <a:buFont typeface="Montserrat"/>
               <a:buNone/>
-            </a:pPr>
-            <a:r>
-              <a:rPr lang="en-US" altLang="ko-KR" sz="2000" b="1" dirty="0" smtClean="0">
+              <a:defRPr sz="1200" b="1" i="0" u="none" strike="noStrike" cap="none">
                 <a:solidFill>
-                  <a:srgbClr val="FFFFFF"/>
+                  <a:srgbClr val="999999"/>
                 </a:solidFill>
-                <a:latin typeface="나눔바른고딕" panose="020B0603020101020101" pitchFamily="50" charset="-127"/>
-                <a:ea typeface="나눔바른고딕" panose="020B0603020101020101" pitchFamily="50" charset="-127"/>
+                <a:latin typeface="Montserrat"/>
+                <a:ea typeface="Montserrat"/>
                 <a:cs typeface="Montserrat"/>
                 <a:sym typeface="Montserrat"/>
-              </a:rPr>
-              <a:t>3. </a:t>
-            </a:r>
-            <a:r>
-              <a:rPr lang="ko-KR" altLang="en-US" sz="2000" b="1" dirty="0" smtClean="0">
-                <a:solidFill>
-                  <a:srgbClr val="FFFFFF"/>
-                </a:solidFill>
-                <a:latin typeface="나눔바른고딕" panose="020B0603020101020101" pitchFamily="50" charset="-127"/>
-                <a:ea typeface="나눔바른고딕" panose="020B0603020101020101" pitchFamily="50" charset="-127"/>
-                <a:cs typeface="Montserrat"/>
-                <a:sym typeface="Montserrat"/>
-              </a:rPr>
-              <a:t>요구사항 정의서</a:t>
-            </a:r>
-            <a:endParaRPr lang="en-US" altLang="ko-KR" sz="2000" b="1" dirty="0" smtClean="0">
-              <a:solidFill>
-                <a:srgbClr val="FFFFFF"/>
-              </a:solidFill>
-              <a:latin typeface="나눔바른고딕" panose="020B0603020101020101" pitchFamily="50" charset="-127"/>
-              <a:ea typeface="나눔바른고딕" panose="020B0603020101020101" pitchFamily="50" charset="-127"/>
-              <a:cs typeface="Montserrat"/>
-              <a:sym typeface="Montserrat"/>
-            </a:endParaRPr>
-          </a:p>
-          <a:p>
-            <a:pPr marL="0" lvl="0" indent="0" rtl="0">
+              </a:defRPr>
+            </a:lvl1pPr>
+            <a:lvl2pPr marR="0" lvl="1" algn="ctr" rtl="0">
               <a:lnSpc>
-                <a:spcPct val="150000"/>
+                <a:spcPct val="100000"/>
               </a:lnSpc>
               <a:spcBef>
                 <a:spcPts val="0"/>
@@ -21562,97 +21601,25 @@
               <a:spcAft>
                 <a:spcPts val="0"/>
               </a:spcAft>
+              <a:buClr>
+                <a:srgbClr val="999999"/>
+              </a:buClr>
+              <a:buSzPts val="1200"/>
+              <a:buFont typeface="Montserrat"/>
               <a:buNone/>
-            </a:pPr>
-            <a:r>
-              <a:rPr lang="en-US" altLang="ko-KR" sz="2000" b="1" dirty="0" smtClean="0">
+              <a:defRPr sz="1200" b="1" i="0" u="none" strike="noStrike" cap="none">
                 <a:solidFill>
-                  <a:srgbClr val="FFFFFF"/>
+                  <a:srgbClr val="999999"/>
                 </a:solidFill>
-                <a:latin typeface="나눔바른고딕" panose="020B0603020101020101" pitchFamily="50" charset="-127"/>
-                <a:ea typeface="나눔바른고딕" panose="020B0603020101020101" pitchFamily="50" charset="-127"/>
+                <a:latin typeface="Montserrat"/>
+                <a:ea typeface="Montserrat"/>
                 <a:cs typeface="Montserrat"/>
                 <a:sym typeface="Montserrat"/>
-              </a:rPr>
-              <a:t>4. [DB </a:t>
-            </a:r>
-            <a:r>
-              <a:rPr lang="ko-KR" altLang="en-US" sz="2000" b="1" dirty="0" smtClean="0">
-                <a:solidFill>
-                  <a:srgbClr val="FFFFFF"/>
-                </a:solidFill>
-                <a:latin typeface="나눔바른고딕" panose="020B0603020101020101" pitchFamily="50" charset="-127"/>
-                <a:ea typeface="나눔바른고딕" panose="020B0603020101020101" pitchFamily="50" charset="-127"/>
-                <a:cs typeface="Montserrat"/>
-                <a:sym typeface="Montserrat"/>
-              </a:rPr>
-              <a:t>설계</a:t>
-            </a:r>
-            <a:r>
-              <a:rPr lang="en-US" altLang="ko-KR" sz="2000" b="1" dirty="0" smtClean="0">
-                <a:solidFill>
-                  <a:srgbClr val="FFFFFF"/>
-                </a:solidFill>
-                <a:latin typeface="나눔바른고딕" panose="020B0603020101020101" pitchFamily="50" charset="-127"/>
-                <a:ea typeface="나눔바른고딕" panose="020B0603020101020101" pitchFamily="50" charset="-127"/>
-                <a:cs typeface="Montserrat"/>
-                <a:sym typeface="Montserrat"/>
-              </a:rPr>
-              <a:t>] ERD </a:t>
-            </a:r>
-            <a:r>
-              <a:rPr lang="ko-KR" altLang="en-US" sz="2000" b="1" dirty="0" smtClean="0">
-                <a:solidFill>
-                  <a:srgbClr val="FFFFFF"/>
-                </a:solidFill>
-                <a:latin typeface="나눔바른고딕" panose="020B0603020101020101" pitchFamily="50" charset="-127"/>
-                <a:ea typeface="나눔바른고딕" panose="020B0603020101020101" pitchFamily="50" charset="-127"/>
-                <a:cs typeface="Montserrat"/>
-                <a:sym typeface="Montserrat"/>
-              </a:rPr>
-              <a:t>설계</a:t>
-            </a:r>
-            <a:r>
-              <a:rPr lang="en-US" altLang="ko-KR" sz="2000" b="1" dirty="0" smtClean="0">
-                <a:solidFill>
-                  <a:srgbClr val="FFFFFF"/>
-                </a:solidFill>
-                <a:latin typeface="나눔바른고딕" panose="020B0603020101020101" pitchFamily="50" charset="-127"/>
-                <a:ea typeface="나눔바른고딕" panose="020B0603020101020101" pitchFamily="50" charset="-127"/>
-                <a:cs typeface="Montserrat"/>
-                <a:sym typeface="Montserrat"/>
-              </a:rPr>
-              <a:t>(</a:t>
-            </a:r>
-            <a:r>
-              <a:rPr lang="ko-KR" altLang="en-US" sz="2000" b="1" dirty="0" smtClean="0">
-                <a:solidFill>
-                  <a:srgbClr val="FFFFFF"/>
-                </a:solidFill>
-                <a:latin typeface="나눔바른고딕" panose="020B0603020101020101" pitchFamily="50" charset="-127"/>
-                <a:ea typeface="나눔바른고딕" panose="020B0603020101020101" pitchFamily="50" charset="-127"/>
-                <a:cs typeface="Montserrat"/>
-                <a:sym typeface="Montserrat"/>
-              </a:rPr>
-              <a:t>초안</a:t>
-            </a:r>
-            <a:r>
-              <a:rPr lang="en-US" altLang="ko-KR" sz="2000" b="1" dirty="0" smtClean="0">
-                <a:solidFill>
-                  <a:srgbClr val="FFFFFF"/>
-                </a:solidFill>
-                <a:latin typeface="나눔바른고딕" panose="020B0603020101020101" pitchFamily="50" charset="-127"/>
-                <a:ea typeface="나눔바른고딕" panose="020B0603020101020101" pitchFamily="50" charset="-127"/>
-                <a:cs typeface="Montserrat"/>
-                <a:sym typeface="Montserrat"/>
-              </a:rPr>
-              <a:t>)</a:t>
-            </a:r>
-          </a:p>
-          <a:p>
-            <a:pPr marL="0" lvl="0" indent="0" rtl="0">
+              </a:defRPr>
+            </a:lvl2pPr>
+            <a:lvl3pPr marR="0" lvl="2" algn="ctr" rtl="0">
               <a:lnSpc>
-                <a:spcPct val="150000"/>
+                <a:spcPct val="100000"/>
               </a:lnSpc>
               <a:spcBef>
                 <a:spcPts val="0"/>
@@ -21660,46 +21627,25 @@
               <a:spcAft>
                 <a:spcPts val="0"/>
               </a:spcAft>
+              <a:buClr>
+                <a:srgbClr val="999999"/>
+              </a:buClr>
+              <a:buSzPts val="1200"/>
+              <a:buFont typeface="Montserrat"/>
               <a:buNone/>
-            </a:pPr>
-            <a:r>
-              <a:rPr lang="en-US" altLang="ko-KR" sz="2000" b="1" dirty="0" smtClean="0">
+              <a:defRPr sz="1200" b="1" i="0" u="none" strike="noStrike" cap="none">
                 <a:solidFill>
-                  <a:srgbClr val="FFFFFF"/>
+                  <a:srgbClr val="999999"/>
                 </a:solidFill>
-                <a:latin typeface="나눔바른고딕" panose="020B0603020101020101" pitchFamily="50" charset="-127"/>
-                <a:ea typeface="나눔바른고딕" panose="020B0603020101020101" pitchFamily="50" charset="-127"/>
+                <a:latin typeface="Montserrat"/>
+                <a:ea typeface="Montserrat"/>
                 <a:cs typeface="Montserrat"/>
                 <a:sym typeface="Montserrat"/>
-              </a:rPr>
-              <a:t>5. </a:t>
-            </a:r>
-            <a:r>
-              <a:rPr lang="ko-KR" altLang="en-US" sz="2000" b="1" dirty="0" smtClean="0">
-                <a:solidFill>
-                  <a:srgbClr val="FFFFFF"/>
-                </a:solidFill>
-                <a:latin typeface="나눔바른고딕" panose="020B0603020101020101" pitchFamily="50" charset="-127"/>
-                <a:ea typeface="나눔바른고딕" panose="020B0603020101020101" pitchFamily="50" charset="-127"/>
-                <a:cs typeface="Montserrat"/>
-                <a:sym typeface="Montserrat"/>
-              </a:rPr>
-              <a:t>화면 설계</a:t>
-            </a:r>
-            <a:endParaRPr lang="en-US" altLang="ko-KR" sz="2000" b="1" dirty="0" smtClean="0">
-              <a:solidFill>
-                <a:srgbClr val="FFFFFF"/>
-              </a:solidFill>
-              <a:latin typeface="나눔바른고딕" panose="020B0603020101020101" pitchFamily="50" charset="-127"/>
-              <a:ea typeface="나눔바른고딕" panose="020B0603020101020101" pitchFamily="50" charset="-127"/>
-              <a:cs typeface="Montserrat"/>
-              <a:sym typeface="Montserrat"/>
-            </a:endParaRPr>
-          </a:p>
-          <a:p>
-            <a:pPr marL="0" lvl="0" indent="0" rtl="0">
+              </a:defRPr>
+            </a:lvl3pPr>
+            <a:lvl4pPr marR="0" lvl="3" algn="ctr" rtl="0">
               <a:lnSpc>
-                <a:spcPct val="150000"/>
+                <a:spcPct val="100000"/>
               </a:lnSpc>
               <a:spcBef>
                 <a:spcPts val="0"/>
@@ -21707,52 +21653,170 @@
               <a:spcAft>
                 <a:spcPts val="0"/>
               </a:spcAft>
+              <a:buClr>
+                <a:srgbClr val="999999"/>
+              </a:buClr>
+              <a:buSzPts val="1200"/>
+              <a:buFont typeface="Montserrat"/>
               <a:buNone/>
-            </a:pPr>
+              <a:defRPr sz="1200" b="1" i="0" u="none" strike="noStrike" cap="none">
+                <a:solidFill>
+                  <a:srgbClr val="999999"/>
+                </a:solidFill>
+                <a:latin typeface="Montserrat"/>
+                <a:ea typeface="Montserrat"/>
+                <a:cs typeface="Montserrat"/>
+                <a:sym typeface="Montserrat"/>
+              </a:defRPr>
+            </a:lvl4pPr>
+            <a:lvl5pPr marR="0" lvl="4" algn="ctr" rtl="0">
+              <a:lnSpc>
+                <a:spcPct val="100000"/>
+              </a:lnSpc>
+              <a:spcBef>
+                <a:spcPts val="0"/>
+              </a:spcBef>
+              <a:spcAft>
+                <a:spcPts val="0"/>
+              </a:spcAft>
+              <a:buClr>
+                <a:srgbClr val="999999"/>
+              </a:buClr>
+              <a:buSzPts val="1200"/>
+              <a:buFont typeface="Montserrat"/>
+              <a:buNone/>
+              <a:defRPr sz="1200" b="1" i="0" u="none" strike="noStrike" cap="none">
+                <a:solidFill>
+                  <a:srgbClr val="999999"/>
+                </a:solidFill>
+                <a:latin typeface="Montserrat"/>
+                <a:ea typeface="Montserrat"/>
+                <a:cs typeface="Montserrat"/>
+                <a:sym typeface="Montserrat"/>
+              </a:defRPr>
+            </a:lvl5pPr>
+            <a:lvl6pPr marR="0" lvl="5" algn="ctr" rtl="0">
+              <a:lnSpc>
+                <a:spcPct val="100000"/>
+              </a:lnSpc>
+              <a:spcBef>
+                <a:spcPts val="0"/>
+              </a:spcBef>
+              <a:spcAft>
+                <a:spcPts val="0"/>
+              </a:spcAft>
+              <a:buClr>
+                <a:srgbClr val="999999"/>
+              </a:buClr>
+              <a:buSzPts val="1200"/>
+              <a:buFont typeface="Montserrat"/>
+              <a:buNone/>
+              <a:defRPr sz="1200" b="1" i="0" u="none" strike="noStrike" cap="none">
+                <a:solidFill>
+                  <a:srgbClr val="999999"/>
+                </a:solidFill>
+                <a:latin typeface="Montserrat"/>
+                <a:ea typeface="Montserrat"/>
+                <a:cs typeface="Montserrat"/>
+                <a:sym typeface="Montserrat"/>
+              </a:defRPr>
+            </a:lvl6pPr>
+            <a:lvl7pPr marR="0" lvl="6" algn="ctr" rtl="0">
+              <a:lnSpc>
+                <a:spcPct val="100000"/>
+              </a:lnSpc>
+              <a:spcBef>
+                <a:spcPts val="0"/>
+              </a:spcBef>
+              <a:spcAft>
+                <a:spcPts val="0"/>
+              </a:spcAft>
+              <a:buClr>
+                <a:srgbClr val="999999"/>
+              </a:buClr>
+              <a:buSzPts val="1200"/>
+              <a:buFont typeface="Montserrat"/>
+              <a:buNone/>
+              <a:defRPr sz="1200" b="1" i="0" u="none" strike="noStrike" cap="none">
+                <a:solidFill>
+                  <a:srgbClr val="999999"/>
+                </a:solidFill>
+                <a:latin typeface="Montserrat"/>
+                <a:ea typeface="Montserrat"/>
+                <a:cs typeface="Montserrat"/>
+                <a:sym typeface="Montserrat"/>
+              </a:defRPr>
+            </a:lvl7pPr>
+            <a:lvl8pPr marR="0" lvl="7" algn="ctr" rtl="0">
+              <a:lnSpc>
+                <a:spcPct val="100000"/>
+              </a:lnSpc>
+              <a:spcBef>
+                <a:spcPts val="0"/>
+              </a:spcBef>
+              <a:spcAft>
+                <a:spcPts val="0"/>
+              </a:spcAft>
+              <a:buClr>
+                <a:srgbClr val="999999"/>
+              </a:buClr>
+              <a:buSzPts val="1200"/>
+              <a:buFont typeface="Montserrat"/>
+              <a:buNone/>
+              <a:defRPr sz="1200" b="1" i="0" u="none" strike="noStrike" cap="none">
+                <a:solidFill>
+                  <a:srgbClr val="999999"/>
+                </a:solidFill>
+                <a:latin typeface="Montserrat"/>
+                <a:ea typeface="Montserrat"/>
+                <a:cs typeface="Montserrat"/>
+                <a:sym typeface="Montserrat"/>
+              </a:defRPr>
+            </a:lvl8pPr>
+            <a:lvl9pPr marR="0" lvl="8" algn="ctr" rtl="0">
+              <a:lnSpc>
+                <a:spcPct val="100000"/>
+              </a:lnSpc>
+              <a:spcBef>
+                <a:spcPts val="0"/>
+              </a:spcBef>
+              <a:spcAft>
+                <a:spcPts val="0"/>
+              </a:spcAft>
+              <a:buClr>
+                <a:srgbClr val="999999"/>
+              </a:buClr>
+              <a:buSzPts val="1200"/>
+              <a:buFont typeface="Montserrat"/>
+              <a:buNone/>
+              <a:defRPr sz="1200" b="1" i="0" u="none" strike="noStrike" cap="none">
+                <a:solidFill>
+                  <a:srgbClr val="999999"/>
+                </a:solidFill>
+                <a:latin typeface="Montserrat"/>
+                <a:ea typeface="Montserrat"/>
+                <a:cs typeface="Montserrat"/>
+                <a:sym typeface="Montserrat"/>
+              </a:defRPr>
+            </a:lvl9pPr>
+          </a:lstStyle>
+          <a:p>
             <a:r>
-              <a:rPr lang="en-US" sz="2000" b="1" dirty="0" smtClean="0">
+              <a:rPr lang="ko-KR" altLang="en-US" sz="3000" dirty="0" smtClean="0">
                 <a:solidFill>
-                  <a:srgbClr val="FFFFFF"/>
+                  <a:srgbClr val="FF9E00"/>
                 </a:solidFill>
                 <a:latin typeface="나눔바른고딕" panose="020B0603020101020101" pitchFamily="50" charset="-127"/>
                 <a:ea typeface="나눔바른고딕" panose="020B0603020101020101" pitchFamily="50" charset="-127"/>
-                <a:cs typeface="Montserrat"/>
-                <a:sym typeface="Montserrat"/>
               </a:rPr>
-              <a:t>6. </a:t>
+              <a:t>목차</a:t>
             </a:r>
-            <a:r>
-              <a:rPr lang="ko-KR" altLang="en-US" sz="2000" b="1" dirty="0" smtClean="0">
-                <a:solidFill>
-                  <a:srgbClr val="FFFFFF"/>
-                </a:solidFill>
-                <a:latin typeface="나눔바른고딕" panose="020B0603020101020101" pitchFamily="50" charset="-127"/>
-                <a:ea typeface="나눔바른고딕" panose="020B0603020101020101" pitchFamily="50" charset="-127"/>
-                <a:cs typeface="Montserrat"/>
-                <a:sym typeface="Montserrat"/>
-              </a:rPr>
-              <a:t>이번 주 </a:t>
-            </a:r>
-            <a:r>
-              <a:rPr lang="en-US" altLang="ko-KR" sz="2000" b="1" dirty="0" err="1" smtClean="0">
-                <a:solidFill>
-                  <a:srgbClr val="FFFFFF"/>
-                </a:solidFill>
-                <a:latin typeface="나눔바른고딕" panose="020B0603020101020101" pitchFamily="50" charset="-127"/>
-                <a:ea typeface="나눔바른고딕" panose="020B0603020101020101" pitchFamily="50" charset="-127"/>
-                <a:cs typeface="Montserrat"/>
-                <a:sym typeface="Montserrat"/>
-              </a:rPr>
-              <a:t>FeedBack</a:t>
-            </a:r>
-            <a:endParaRPr sz="2000" b="1" dirty="0">
+            <a:endParaRPr lang="ko-KR" altLang="en-US" sz="3000" dirty="0">
               <a:solidFill>
-                <a:srgbClr val="FFFFFF"/>
+                <a:srgbClr val="FF9E00"/>
               </a:solidFill>
               <a:latin typeface="나눔바른고딕" panose="020B0603020101020101" pitchFamily="50" charset="-127"/>
               <a:ea typeface="나눔바른고딕" panose="020B0603020101020101" pitchFamily="50" charset="-127"/>
-              <a:cs typeface="Montserrat"/>
-              <a:sym typeface="Montserrat"/>
             </a:endParaRPr>
           </a:p>
         </p:txBody>
@@ -21760,7 +21824,7 @@
     </p:spTree>
     <p:extLst>
       <p:ext uri="{BB962C8B-B14F-4D97-AF65-F5344CB8AC3E}">
-        <p14:creationId xmlns:p14="http://schemas.microsoft.com/office/powerpoint/2010/main" val="3233340305"/>
+        <p14:creationId xmlns:p14="http://schemas.microsoft.com/office/powerpoint/2010/main" val="2063738790"/>
       </p:ext>
     </p:extLst>
   </p:cSld>
@@ -27122,8 +27186,8 @@
         </p:nvSpPr>
         <p:spPr>
           <a:xfrm>
-            <a:off x="1603801" y="2211710"/>
-            <a:ext cx="5936400" cy="1159800"/>
+            <a:off x="0" y="2211710"/>
+            <a:ext cx="9144000" cy="1159800"/>
           </a:xfrm>
           <a:prstGeom prst="rect">
             <a:avLst/>
@@ -27874,6 +27938,14 @@
 <file path=ppt/slides/slide27.xml><?xml version="1.0" encoding="utf-8"?>
 <p:sld xmlns:a="http://schemas.openxmlformats.org/drawingml/2006/main" xmlns:r="http://schemas.openxmlformats.org/officeDocument/2006/relationships" xmlns:p="http://schemas.openxmlformats.org/presentationml/2006/main">
   <p:cSld>
+    <p:bg>
+      <p:bgPr>
+        <a:solidFill>
+          <a:srgbClr val="FF9E00"/>
+        </a:solidFill>
+        <a:effectLst/>
+      </p:bgPr>
+    </p:bg>
     <p:spTree>
       <p:nvGrpSpPr>
         <p:cNvPr id="1" name=""/>
@@ -30113,7 +30185,7 @@
           <p:cNvPr id="7" name="직사각형 42">
             <a:extLst>
               <a:ext uri="{FF2B5EF4-FFF2-40B4-BE49-F238E27FC236}">
-                <a16:creationId xmlns="" xmlns:a16="http://schemas.microsoft.com/office/drawing/2014/main" id="{8B732A0B-8794-4D6F-8FB1-2A615F6491AF}"/>
+                <a16:creationId xmlns:a16="http://schemas.microsoft.com/office/drawing/2014/main" xmlns="" id="{8B732A0B-8794-4D6F-8FB1-2A615F6491AF}"/>
               </a:ext>
             </a:extLst>
           </p:cNvPr>
@@ -30174,7 +30246,7 @@
           <p:cNvPr id="8" name="직사각형 42">
             <a:extLst>
               <a:ext uri="{FF2B5EF4-FFF2-40B4-BE49-F238E27FC236}">
-                <a16:creationId xmlns="" xmlns:a16="http://schemas.microsoft.com/office/drawing/2014/main" id="{9BD0AFB8-07AD-46B3-8A8C-8F5626B992D4}"/>
+                <a16:creationId xmlns:a16="http://schemas.microsoft.com/office/drawing/2014/main" xmlns="" id="{9BD0AFB8-07AD-46B3-8A8C-8F5626B992D4}"/>
               </a:ext>
             </a:extLst>
           </p:cNvPr>
@@ -30235,7 +30307,7 @@
           <p:cNvPr id="10" name="직사각형 42">
             <a:extLst>
               <a:ext uri="{FF2B5EF4-FFF2-40B4-BE49-F238E27FC236}">
-                <a16:creationId xmlns="" xmlns:a16="http://schemas.microsoft.com/office/drawing/2014/main" id="{659B2C0F-8D66-437F-9A45-126C41D32DED}"/>
+                <a16:creationId xmlns:a16="http://schemas.microsoft.com/office/drawing/2014/main" xmlns="" id="{659B2C0F-8D66-437F-9A45-126C41D32DED}"/>
               </a:ext>
             </a:extLst>
           </p:cNvPr>
@@ -30315,7 +30387,7 @@
           <p:cNvPr id="11" name="직사각형 42">
             <a:extLst>
               <a:ext uri="{FF2B5EF4-FFF2-40B4-BE49-F238E27FC236}">
-                <a16:creationId xmlns="" xmlns:a16="http://schemas.microsoft.com/office/drawing/2014/main" id="{EABD93CA-FE0D-4A80-AA49-00998EFFE9CD}"/>
+                <a16:creationId xmlns:a16="http://schemas.microsoft.com/office/drawing/2014/main" xmlns="" id="{EABD93CA-FE0D-4A80-AA49-00998EFFE9CD}"/>
               </a:ext>
             </a:extLst>
           </p:cNvPr>

</xml_diff>